<commit_message>
tweak install  myWindCode.cpp not .ino
</commit_message>
<xml_diff>
--- a/Documentation/A Course Controls Laptop Setup Instructions Standalone Photon.pptx
+++ b/Documentation/A Course Controls Laptop Setup Instructions Standalone Photon.pptx
@@ -5,10 +5,10 @@
     <p:sldMasterId id="2147483664" r:id="rId1"/>
   </p:sldMasterIdLst>
   <p:notesMasterIdLst>
-    <p:notesMasterId r:id="rId17"/>
+    <p:notesMasterId r:id="rId18"/>
   </p:notesMasterIdLst>
   <p:handoutMasterIdLst>
-    <p:handoutMasterId r:id="rId18"/>
+    <p:handoutMasterId r:id="rId19"/>
   </p:handoutMasterIdLst>
   <p:sldIdLst>
     <p:sldId id="1048" r:id="rId2"/>
@@ -20,35 +20,36 @@
     <p:sldId id="1052" r:id="rId8"/>
     <p:sldId id="1053" r:id="rId9"/>
     <p:sldId id="1054" r:id="rId10"/>
-    <p:sldId id="1056" r:id="rId11"/>
-    <p:sldId id="1055" r:id="rId12"/>
-    <p:sldId id="1057" r:id="rId13"/>
-    <p:sldId id="1062" r:id="rId14"/>
-    <p:sldId id="1059" r:id="rId15"/>
-    <p:sldId id="1060" r:id="rId16"/>
+    <p:sldId id="1063" r:id="rId11"/>
+    <p:sldId id="1056" r:id="rId12"/>
+    <p:sldId id="1055" r:id="rId13"/>
+    <p:sldId id="1057" r:id="rId14"/>
+    <p:sldId id="1062" r:id="rId15"/>
+    <p:sldId id="1059" r:id="rId16"/>
+    <p:sldId id="1060" r:id="rId17"/>
   </p:sldIdLst>
   <p:sldSz cx="9144000" cy="6858000" type="screen4x3"/>
   <p:notesSz cx="7023100" cy="9309100"/>
   <p:embeddedFontLst>
     <p:embeddedFont>
       <p:font typeface="GE Inspira Pitch" panose="020B0604020202020204" charset="0"/>
-      <p:regular r:id="rId19"/>
-      <p:bold r:id="rId20"/>
-      <p:italic r:id="rId21"/>
+      <p:regular r:id="rId20"/>
+      <p:bold r:id="rId21"/>
+      <p:italic r:id="rId22"/>
+    </p:embeddedFont>
+    <p:embeddedFont>
+      <p:font typeface="Consolas" panose="020B0609020204030204" pitchFamily="49" charset="0"/>
+      <p:regular r:id="rId23"/>
+      <p:bold r:id="rId24"/>
+      <p:italic r:id="rId25"/>
+      <p:boldItalic r:id="rId26"/>
     </p:embeddedFont>
     <p:embeddedFont>
       <p:font typeface="Helvetica" panose="020B0604020202020204" pitchFamily="34" charset="0"/>
-      <p:regular r:id="rId22"/>
-      <p:bold r:id="rId23"/>
-      <p:italic r:id="rId24"/>
-      <p:boldItalic r:id="rId25"/>
-    </p:embeddedFont>
-    <p:embeddedFont>
-      <p:font typeface="Consolas" panose="020B0609020204030204" pitchFamily="49" charset="0"/>
-      <p:regular r:id="rId26"/>
-      <p:bold r:id="rId27"/>
-      <p:italic r:id="rId28"/>
-      <p:boldItalic r:id="rId29"/>
+      <p:regular r:id="rId27"/>
+      <p:bold r:id="rId28"/>
+      <p:italic r:id="rId29"/>
+      <p:boldItalic r:id="rId30"/>
     </p:embeddedFont>
   </p:embeddedFontLst>
   <p:defaultTextStyle>
@@ -5548,97 +5549,25 @@
           <a:lstStyle/>
           <a:p>
             <a:r>
-              <a:rPr lang="en-US" dirty="0"/>
-              <a:t>Step 6: Install Particle Firmware</a:t>
-            </a:r>
+              <a:rPr lang="en-US" dirty="0" smtClean="0"/>
+              <a:t>Windows 10 PATH</a:t>
+            </a:r>
+            <a:endParaRPr lang="en-US" dirty="0"/>
           </a:p>
         </p:txBody>
       </p:sp>
       <p:sp>
         <p:nvSpPr>
-          <p:cNvPr id="5" name="Rectangle 4"/>
-          <p:cNvSpPr/>
+          <p:cNvPr id="6" name="Rectangle 1"/>
+          <p:cNvSpPr>
+            <a:spLocks noChangeArrowheads="1"/>
+          </p:cNvSpPr>
           <p:nvPr/>
         </p:nvSpPr>
-        <p:spPr>
-          <a:xfrm>
-            <a:off x="904875" y="1118741"/>
-            <a:ext cx="6429375" cy="584775"/>
-          </a:xfrm>
-          <a:prstGeom prst="rect">
-            <a:avLst/>
-          </a:prstGeom>
-        </p:spPr>
-        <p:txBody>
-          <a:bodyPr wrap="square">
-            <a:spAutoFit/>
-          </a:bodyPr>
-          <a:lstStyle/>
-          <a:p>
-            <a:r>
-              <a:rPr lang="en-US" dirty="0">
-                <a:hlinkClick r:id="rId2"/>
-              </a:rPr>
-              <a:t>https://github.com/spark/firmware</a:t>
-            </a:r>
-            <a:endParaRPr lang="en-US" dirty="0"/>
-          </a:p>
-        </p:txBody>
-      </p:sp>
-      <p:sp>
-        <p:nvSpPr>
-          <p:cNvPr id="6" name="TextBox 5"/>
-          <p:cNvSpPr txBox="1"/>
-          <p:nvPr/>
-        </p:nvSpPr>
-        <p:spPr>
-          <a:xfrm>
-            <a:off x="1213585" y="718478"/>
-            <a:ext cx="1646285" cy="400110"/>
-          </a:xfrm>
-          <a:prstGeom prst="rect">
-            <a:avLst/>
-          </a:prstGeom>
-          <a:noFill/>
-        </p:spPr>
-        <p:txBody>
-          <a:bodyPr wrap="none" rtlCol="0">
-            <a:spAutoFit/>
-          </a:bodyPr>
-          <a:lstStyle/>
-          <a:p>
-            <a:r>
-              <a:rPr lang="en-US" sz="2000" i="1" dirty="0"/>
-              <a:t>Get the latest</a:t>
-            </a:r>
-          </a:p>
-        </p:txBody>
-      </p:sp>
-      <p:pic>
-        <p:nvPicPr>
-          <p:cNvPr id="6146" name="Picture 2"/>
-          <p:cNvPicPr>
-            <a:picLocks noChangeAspect="1" noChangeArrowheads="1"/>
-          </p:cNvPicPr>
-          <p:nvPr/>
-        </p:nvPicPr>
-        <p:blipFill>
-          <a:blip r:embed="rId3">
-            <a:extLst>
-              <a:ext uri="{28A0092B-C50C-407E-A947-70E740481C1C}">
-                <a14:useLocalDpi xmlns:a14="http://schemas.microsoft.com/office/drawing/2010/main" val="0"/>
-              </a:ext>
-            </a:extLst>
-          </a:blip>
-          <a:srcRect/>
-          <a:stretch>
-            <a:fillRect/>
-          </a:stretch>
-        </p:blipFill>
         <p:spPr bwMode="auto">
           <a:xfrm>
-            <a:off x="352425" y="1703516"/>
-            <a:ext cx="5257800" cy="2230425"/>
+            <a:off x="504825" y="1279525"/>
+            <a:ext cx="6257482" cy="3785652"/>
           </a:xfrm>
           <a:prstGeom prst="rect">
             <a:avLst/>
@@ -5647,6 +5576,7 @@
           <a:ln>
             <a:noFill/>
           </a:ln>
+          <a:effectLst/>
           <a:extLst>
             <a:ext uri="{909E8E84-426E-40DD-AFC4-6F175D3DCCD1}">
               <a14:hiddenFill xmlns:a14="http://schemas.microsoft.com/office/drawing/2010/main">
@@ -5665,326 +5595,549 @@
                 <a:tailEnd/>
               </a14:hiddenLine>
             </a:ext>
+            <a:ext uri="{AF507438-7753-43E0-B8FC-AC1667EBCBE1}">
+              <a14:hiddenEffects xmlns:a14="http://schemas.microsoft.com/office/drawing/2010/main">
+                <a:effectLst>
+                  <a:outerShdw dist="35921" dir="2700000" algn="ctr" rotWithShape="0">
+                    <a:schemeClr val="bg2"/>
+                  </a:outerShdw>
+                </a:effectLst>
+              </a14:hiddenEffects>
+            </a:ext>
           </a:extLst>
         </p:spPr>
-      </p:pic>
-      <p:sp>
-        <p:nvSpPr>
-          <p:cNvPr id="8" name="Rectangle 7"/>
-          <p:cNvSpPr/>
-          <p:nvPr/>
-        </p:nvSpPr>
-        <p:spPr>
-          <a:xfrm>
-            <a:off x="4696045" y="3676649"/>
-            <a:ext cx="990380" cy="171451"/>
-          </a:xfrm>
-          <a:prstGeom prst="rect">
-            <a:avLst/>
-          </a:prstGeom>
-          <a:noFill/>
-          <a:ln>
-            <a:solidFill>
-              <a:schemeClr val="bg2"/>
-            </a:solidFill>
-          </a:ln>
-        </p:spPr>
-        <p:style>
-          <a:lnRef idx="2">
-            <a:schemeClr val="accent1">
-              <a:shade val="50000"/>
-            </a:schemeClr>
-          </a:lnRef>
-          <a:fillRef idx="1">
-            <a:schemeClr val="accent1"/>
-          </a:fillRef>
-          <a:effectRef idx="0">
-            <a:schemeClr val="accent1"/>
-          </a:effectRef>
-          <a:fontRef idx="minor">
-            <a:schemeClr val="lt1"/>
-          </a:fontRef>
-        </p:style>
         <p:txBody>
-          <a:bodyPr rtlCol="0" anchor="ctr"/>
-          <a:lstStyle/>
-          <a:p>
-            <a:pPr algn="ctr"/>
-            <a:endParaRPr lang="en-US"/>
-          </a:p>
-        </p:txBody>
-      </p:sp>
-      <p:cxnSp>
-        <p:nvCxnSpPr>
-          <p:cNvPr id="9" name="Straight Arrow Connector 8"/>
-          <p:cNvCxnSpPr>
-            <a:endCxn id="8" idx="3"/>
-          </p:cNvCxnSpPr>
-          <p:nvPr/>
-        </p:nvCxnSpPr>
-        <p:spPr>
-          <a:xfrm flipH="1">
-            <a:off x="5686425" y="2190750"/>
-            <a:ext cx="1191292" cy="1571625"/>
-          </a:xfrm>
-          <a:prstGeom prst="straightConnector1">
-            <a:avLst/>
-          </a:prstGeom>
-          <a:ln>
-            <a:solidFill>
-              <a:schemeClr val="bg2"/>
-            </a:solidFill>
-            <a:headEnd type="none" w="med" len="med"/>
-            <a:tailEnd type="triangle" w="med" len="med"/>
-          </a:ln>
-        </p:spPr>
-        <p:style>
-          <a:lnRef idx="1">
-            <a:schemeClr val="accent1"/>
-          </a:lnRef>
-          <a:fillRef idx="0">
-            <a:schemeClr val="accent1"/>
-          </a:fillRef>
-          <a:effectRef idx="0">
-            <a:schemeClr val="accent1"/>
-          </a:effectRef>
-          <a:fontRef idx="minor">
-            <a:schemeClr val="tx1"/>
-          </a:fontRef>
-        </p:style>
-      </p:cxnSp>
-      <p:sp>
-        <p:nvSpPr>
-          <p:cNvPr id="10" name="Rectangle 9"/>
-          <p:cNvSpPr/>
-          <p:nvPr/>
-        </p:nvSpPr>
-        <p:spPr>
-          <a:xfrm>
-            <a:off x="6220545" y="1898362"/>
-            <a:ext cx="1695010" cy="830997"/>
-          </a:xfrm>
-          <a:prstGeom prst="rect">
-            <a:avLst/>
-          </a:prstGeom>
-          <a:solidFill>
-            <a:schemeClr val="bg1"/>
-          </a:solidFill>
-        </p:spPr>
-        <p:txBody>
-          <a:bodyPr wrap="square">
+          <a:bodyPr vert="horz" wrap="none" lIns="91440" tIns="45720" rIns="91440" bIns="45720" numCol="1" anchor="ctr" anchorCtr="0" compatLnSpc="1">
+            <a:prstTxWarp prst="textNoShape">
+              <a:avLst/>
+            </a:prstTxWarp>
             <a:spAutoFit/>
           </a:bodyPr>
-          <a:lstStyle/>
-          <a:p>
-            <a:r>
-              <a:rPr lang="en-US" sz="1600" dirty="0"/>
-              <a:t>Click “Download ZIP</a:t>
-            </a:r>
-            <a:r>
-              <a:rPr lang="en-US" sz="1600" dirty="0" smtClean="0"/>
-              <a:t>” or “Clone in Desktop”</a:t>
-            </a:r>
-            <a:endParaRPr lang="en-US" sz="1600" dirty="0"/>
-          </a:p>
-        </p:txBody>
-      </p:sp>
-      <p:pic>
-        <p:nvPicPr>
-          <p:cNvPr id="6147" name="Picture 3"/>
-          <p:cNvPicPr>
-            <a:picLocks noChangeAspect="1" noChangeArrowheads="1"/>
-          </p:cNvPicPr>
-          <p:nvPr/>
-        </p:nvPicPr>
-        <p:blipFill>
-          <a:blip r:embed="rId4">
-            <a:extLst>
-              <a:ext uri="{28A0092B-C50C-407E-A947-70E740481C1C}">
-                <a14:useLocalDpi xmlns:a14="http://schemas.microsoft.com/office/drawing/2010/main" val="0"/>
-              </a:ext>
-            </a:extLst>
-          </a:blip>
-          <a:srcRect/>
-          <a:stretch>
-            <a:fillRect/>
-          </a:stretch>
-        </p:blipFill>
-        <p:spPr bwMode="auto">
-          <a:xfrm>
-            <a:off x="904875" y="4457700"/>
-            <a:ext cx="2857500" cy="1828800"/>
-          </a:xfrm>
-          <a:prstGeom prst="rect">
-            <a:avLst/>
-          </a:prstGeom>
-          <a:noFill/>
-          <a:ln>
-            <a:noFill/>
-          </a:ln>
-          <a:extLst>
-            <a:ext uri="{909E8E84-426E-40DD-AFC4-6F175D3DCCD1}">
-              <a14:hiddenFill xmlns:a14="http://schemas.microsoft.com/office/drawing/2010/main">
-                <a:solidFill>
-                  <a:schemeClr val="accent1"/>
-                </a:solidFill>
-              </a14:hiddenFill>
-            </a:ext>
-            <a:ext uri="{91240B29-F687-4F45-9708-019B960494DF}">
-              <a14:hiddenLine xmlns:a14="http://schemas.microsoft.com/office/drawing/2010/main" w="9525">
+          <a:lstStyle>
+            <a:lvl1pPr>
+              <a:defRPr>
                 <a:solidFill>
                   <a:schemeClr val="tx1"/>
                 </a:solidFill>
-                <a:miter lim="800000"/>
-                <a:headEnd/>
-                <a:tailEnd/>
-              </a14:hiddenLine>
-            </a:ext>
-          </a:extLst>
-        </p:spPr>
-      </p:pic>
-      <p:cxnSp>
-        <p:nvCxnSpPr>
-          <p:cNvPr id="13" name="Straight Arrow Connector 12"/>
-          <p:cNvCxnSpPr/>
-          <p:nvPr/>
-        </p:nvCxnSpPr>
-        <p:spPr>
-          <a:xfrm flipH="1">
-            <a:off x="2981325" y="4457700"/>
-            <a:ext cx="1247775" cy="1009650"/>
-          </a:xfrm>
-          <a:prstGeom prst="straightConnector1">
-            <a:avLst/>
-          </a:prstGeom>
-          <a:ln>
-            <a:solidFill>
-              <a:schemeClr val="bg2"/>
-            </a:solidFill>
-            <a:headEnd type="none" w="med" len="med"/>
-            <a:tailEnd type="triangle" w="med" len="med"/>
-          </a:ln>
-        </p:spPr>
-        <p:style>
-          <a:lnRef idx="1">
-            <a:schemeClr val="accent1"/>
-          </a:lnRef>
-          <a:fillRef idx="0">
-            <a:schemeClr val="accent1"/>
-          </a:fillRef>
-          <a:effectRef idx="0">
-            <a:schemeClr val="accent1"/>
-          </a:effectRef>
-          <a:fontRef idx="minor">
-            <a:schemeClr val="tx1"/>
-          </a:fontRef>
-        </p:style>
-      </p:cxnSp>
-      <p:sp>
-        <p:nvSpPr>
-          <p:cNvPr id="16" name="Rectangle 15"/>
-          <p:cNvSpPr/>
-          <p:nvPr/>
-        </p:nvSpPr>
-        <p:spPr>
-          <a:xfrm>
-            <a:off x="4419820" y="3968174"/>
-            <a:ext cx="1695010" cy="584775"/>
-          </a:xfrm>
-          <a:prstGeom prst="rect">
-            <a:avLst/>
-          </a:prstGeom>
-          <a:solidFill>
-            <a:schemeClr val="bg1"/>
-          </a:solidFill>
-        </p:spPr>
-        <p:txBody>
-          <a:bodyPr wrap="square">
-            <a:spAutoFit/>
-          </a:bodyPr>
-          <a:lstStyle/>
-          <a:p>
-            <a:r>
-              <a:rPr lang="en-US" sz="1600" dirty="0"/>
-              <a:t>Extract to GitHub Folder</a:t>
-            </a:r>
-          </a:p>
-        </p:txBody>
-      </p:sp>
-      <p:sp>
-        <p:nvSpPr>
-          <p:cNvPr id="12" name="Rectangle 11"/>
-          <p:cNvSpPr/>
-          <p:nvPr/>
-        </p:nvSpPr>
-        <p:spPr>
-          <a:xfrm>
-            <a:off x="6552058" y="2767845"/>
-            <a:ext cx="2085975" cy="1754326"/>
-          </a:xfrm>
-          <a:prstGeom prst="rect">
-            <a:avLst/>
-          </a:prstGeom>
-          <a:solidFill>
-            <a:schemeClr val="bg1"/>
-          </a:solidFill>
-        </p:spPr>
-        <p:txBody>
-          <a:bodyPr wrap="square">
-            <a:spAutoFit/>
-          </a:bodyPr>
-          <a:lstStyle/>
-          <a:p>
-            <a:r>
-              <a:rPr lang="en-US" sz="1800" i="1" dirty="0" smtClean="0">
-                <a:solidFill>
-                  <a:srgbClr val="FF0000"/>
-                </a:solidFill>
-              </a:rPr>
-              <a:t>If cloning get latest “release”</a:t>
-            </a:r>
-          </a:p>
-          <a:p>
-            <a:r>
-              <a:rPr lang="en-US" sz="1800" i="1" dirty="0" smtClean="0">
-                <a:solidFill>
-                  <a:srgbClr val="FF0000"/>
-                </a:solidFill>
-              </a:rPr>
-              <a:t>I got branch: “release/v0.6.2</a:t>
-            </a:r>
-            <a:r>
-              <a:rPr lang="en-US" sz="1800" i="1" dirty="0" smtClean="0">
-                <a:solidFill>
-                  <a:srgbClr val="FF0000"/>
-                </a:solidFill>
-              </a:rPr>
-              <a:t>”</a:t>
-            </a:r>
-          </a:p>
-          <a:p>
-            <a:r>
-              <a:rPr lang="en-US" sz="1800" i="1" dirty="0" smtClean="0">
-                <a:solidFill>
-                  <a:srgbClr val="FF0000"/>
-                </a:solidFill>
-              </a:rPr>
-              <a:t>Xxx </a:t>
-            </a:r>
-          </a:p>
-          <a:p>
-            <a:r>
-              <a:rPr lang="en-US" sz="1800" i="1" dirty="0" smtClean="0">
-                <a:solidFill>
-                  <a:srgbClr val="FF0000"/>
-                </a:solidFill>
-              </a:rPr>
-              <a:t>“develop”</a:t>
-            </a:r>
-            <a:endParaRPr lang="en-US" sz="1800" i="1" dirty="0">
+                <a:latin typeface="Arial" panose="020B0604020202020204" pitchFamily="34" charset="0"/>
+              </a:defRPr>
+            </a:lvl1pPr>
+            <a:lvl2pPr>
+              <a:defRPr>
+                <a:solidFill>
+                  <a:schemeClr val="tx1"/>
+                </a:solidFill>
+                <a:latin typeface="Arial" panose="020B0604020202020204" pitchFamily="34" charset="0"/>
+              </a:defRPr>
+            </a:lvl2pPr>
+            <a:lvl3pPr>
+              <a:defRPr>
+                <a:solidFill>
+                  <a:schemeClr val="tx1"/>
+                </a:solidFill>
+                <a:latin typeface="Arial" panose="020B0604020202020204" pitchFamily="34" charset="0"/>
+              </a:defRPr>
+            </a:lvl3pPr>
+            <a:lvl4pPr>
+              <a:defRPr>
+                <a:solidFill>
+                  <a:schemeClr val="tx1"/>
+                </a:solidFill>
+                <a:latin typeface="Arial" panose="020B0604020202020204" pitchFamily="34" charset="0"/>
+              </a:defRPr>
+            </a:lvl4pPr>
+            <a:lvl5pPr>
+              <a:defRPr>
+                <a:solidFill>
+                  <a:schemeClr val="tx1"/>
+                </a:solidFill>
+                <a:latin typeface="Arial" panose="020B0604020202020204" pitchFamily="34" charset="0"/>
+              </a:defRPr>
+            </a:lvl5pPr>
+            <a:lvl6pPr eaLnBrk="0" fontAlgn="base" hangingPunct="0">
+              <a:spcBef>
+                <a:spcPct val="0"/>
+              </a:spcBef>
+              <a:spcAft>
+                <a:spcPct val="0"/>
+              </a:spcAft>
+              <a:defRPr>
+                <a:solidFill>
+                  <a:schemeClr val="tx1"/>
+                </a:solidFill>
+                <a:latin typeface="Arial" panose="020B0604020202020204" pitchFamily="34" charset="0"/>
+              </a:defRPr>
+            </a:lvl6pPr>
+            <a:lvl7pPr eaLnBrk="0" fontAlgn="base" hangingPunct="0">
+              <a:spcBef>
+                <a:spcPct val="0"/>
+              </a:spcBef>
+              <a:spcAft>
+                <a:spcPct val="0"/>
+              </a:spcAft>
+              <a:defRPr>
+                <a:solidFill>
+                  <a:schemeClr val="tx1"/>
+                </a:solidFill>
+                <a:latin typeface="Arial" panose="020B0604020202020204" pitchFamily="34" charset="0"/>
+              </a:defRPr>
+            </a:lvl7pPr>
+            <a:lvl8pPr eaLnBrk="0" fontAlgn="base" hangingPunct="0">
+              <a:spcBef>
+                <a:spcPct val="0"/>
+              </a:spcBef>
+              <a:spcAft>
+                <a:spcPct val="0"/>
+              </a:spcAft>
+              <a:defRPr>
+                <a:solidFill>
+                  <a:schemeClr val="tx1"/>
+                </a:solidFill>
+                <a:latin typeface="Arial" panose="020B0604020202020204" pitchFamily="34" charset="0"/>
+              </a:defRPr>
+            </a:lvl8pPr>
+            <a:lvl9pPr eaLnBrk="0" fontAlgn="base" hangingPunct="0">
+              <a:spcBef>
+                <a:spcPct val="0"/>
+              </a:spcBef>
+              <a:spcAft>
+                <a:spcPct val="0"/>
+              </a:spcAft>
+              <a:defRPr>
+                <a:solidFill>
+                  <a:schemeClr val="tx1"/>
+                </a:solidFill>
+                <a:latin typeface="Arial" panose="020B0604020202020204" pitchFamily="34" charset="0"/>
+              </a:defRPr>
+            </a:lvl9pPr>
+          </a:lstStyle>
+          <a:p>
+            <a:pPr marL="0" marR="0" lvl="0" indent="0" algn="l" defTabSz="914400" rtl="0" eaLnBrk="0" fontAlgn="base" latinLnBrk="0" hangingPunct="0">
+              <a:lnSpc>
+                <a:spcPct val="100000"/>
+              </a:lnSpc>
+              <a:spcBef>
+                <a:spcPct val="0"/>
+              </a:spcBef>
+              <a:spcAft>
+                <a:spcPct val="0"/>
+              </a:spcAft>
+              <a:buClrTx/>
+              <a:buSzTx/>
+              <a:buFontTx/>
+              <a:buNone/>
+              <a:tabLst/>
+            </a:pPr>
+            <a:r>
+              <a:rPr kumimoji="0" lang="en-US" altLang="en-US" sz="1600" b="0" i="0" u="none" strike="noStrike" cap="none" normalizeH="0" baseline="0" dirty="0" smtClean="0">
+                <a:ln>
+                  <a:noFill/>
+                </a:ln>
+                <a:solidFill>
+                  <a:srgbClr val="212121"/>
+                </a:solidFill>
+                <a:effectLst/>
+                <a:latin typeface="Arial" panose="020B0604020202020204" pitchFamily="34" charset="0"/>
+              </a:rPr>
+              <a:t>C:\Program Files (x86)\GNU Tools ARM Embedded\5.4 2016q3\bin</a:t>
+            </a:r>
+            <a:r>
+              <a:rPr kumimoji="0" lang="en-US" altLang="en-US" sz="1100" b="0" i="0" u="none" strike="noStrike" cap="none" normalizeH="0" baseline="0" dirty="0" smtClean="0">
+                <a:ln>
+                  <a:noFill/>
+                </a:ln>
+                <a:solidFill>
+                  <a:schemeClr val="tx1"/>
+                </a:solidFill>
+                <a:effectLst/>
+              </a:rPr>
+              <a:t/>
+            </a:r>
+            <a:br>
+              <a:rPr kumimoji="0" lang="en-US" altLang="en-US" sz="1100" b="0" i="0" u="none" strike="noStrike" cap="none" normalizeH="0" baseline="0" dirty="0" smtClean="0">
+                <a:ln>
+                  <a:noFill/>
+                </a:ln>
+                <a:solidFill>
+                  <a:schemeClr val="tx1"/>
+                </a:solidFill>
+                <a:effectLst/>
+              </a:rPr>
+            </a:br>
+            <a:r>
+              <a:rPr kumimoji="0" lang="en-US" altLang="en-US" sz="1600" b="0" i="0" u="none" strike="noStrike" cap="none" normalizeH="0" baseline="0" dirty="0" smtClean="0">
+                <a:ln>
+                  <a:noFill/>
+                </a:ln>
+                <a:solidFill>
+                  <a:srgbClr val="212121"/>
+                </a:solidFill>
+                <a:effectLst/>
+                <a:latin typeface="Arial" panose="020B0604020202020204" pitchFamily="34" charset="0"/>
+                <a:cs typeface="Arial" panose="020B0604020202020204" pitchFamily="34" charset="0"/>
+              </a:rPr>
+              <a:t>C:\Users\Dave\AppData\Local\particle\bin</a:t>
+            </a:r>
+            <a:br>
+              <a:rPr kumimoji="0" lang="en-US" altLang="en-US" sz="1600" b="0" i="0" u="none" strike="noStrike" cap="none" normalizeH="0" baseline="0" dirty="0" smtClean="0">
+                <a:ln>
+                  <a:noFill/>
+                </a:ln>
+                <a:solidFill>
+                  <a:srgbClr val="212121"/>
+                </a:solidFill>
+                <a:effectLst/>
+                <a:latin typeface="Arial" panose="020B0604020202020204" pitchFamily="34" charset="0"/>
+                <a:cs typeface="Arial" panose="020B0604020202020204" pitchFamily="34" charset="0"/>
+              </a:rPr>
+            </a:br>
+            <a:r>
+              <a:rPr kumimoji="0" lang="en-US" altLang="en-US" sz="1600" b="0" i="0" u="none" strike="noStrike" cap="none" normalizeH="0" baseline="0" dirty="0" smtClean="0">
+                <a:ln>
+                  <a:noFill/>
+                </a:ln>
+                <a:solidFill>
+                  <a:srgbClr val="212121"/>
+                </a:solidFill>
+                <a:effectLst/>
+                <a:latin typeface="Arial" panose="020B0604020202020204" pitchFamily="34" charset="0"/>
+                <a:cs typeface="Arial" panose="020B0604020202020204" pitchFamily="34" charset="0"/>
+              </a:rPr>
+              <a:t>C:\Users\Dave\AppData\Roaming\npm</a:t>
+            </a:r>
+            <a:br>
+              <a:rPr kumimoji="0" lang="en-US" altLang="en-US" sz="1600" b="0" i="0" u="none" strike="noStrike" cap="none" normalizeH="0" baseline="0" dirty="0" smtClean="0">
+                <a:ln>
+                  <a:noFill/>
+                </a:ln>
+                <a:solidFill>
+                  <a:srgbClr val="212121"/>
+                </a:solidFill>
+                <a:effectLst/>
+                <a:latin typeface="Arial" panose="020B0604020202020204" pitchFamily="34" charset="0"/>
+                <a:cs typeface="Arial" panose="020B0604020202020204" pitchFamily="34" charset="0"/>
+              </a:rPr>
+            </a:br>
+            <a:r>
+              <a:rPr kumimoji="0" lang="en-US" altLang="en-US" sz="1600" b="0" i="0" u="none" strike="noStrike" cap="none" normalizeH="0" baseline="0" dirty="0" smtClean="0">
+                <a:ln>
+                  <a:noFill/>
+                </a:ln>
+                <a:solidFill>
+                  <a:srgbClr val="212121"/>
+                </a:solidFill>
+                <a:effectLst/>
+                <a:latin typeface="Arial" panose="020B0604020202020204" pitchFamily="34" charset="0"/>
+                <a:cs typeface="Arial" panose="020B0604020202020204" pitchFamily="34" charset="0"/>
+              </a:rPr>
+              <a:t>C:\Particle\Toolchain\Make\bin</a:t>
+            </a:r>
+            <a:br>
+              <a:rPr kumimoji="0" lang="en-US" altLang="en-US" sz="1600" b="0" i="0" u="none" strike="noStrike" cap="none" normalizeH="0" baseline="0" dirty="0" smtClean="0">
+                <a:ln>
+                  <a:noFill/>
+                </a:ln>
+                <a:solidFill>
+                  <a:srgbClr val="212121"/>
+                </a:solidFill>
+                <a:effectLst/>
+                <a:latin typeface="Arial" panose="020B0604020202020204" pitchFamily="34" charset="0"/>
+                <a:cs typeface="Arial" panose="020B0604020202020204" pitchFamily="34" charset="0"/>
+              </a:rPr>
+            </a:br>
+            <a:r>
+              <a:rPr kumimoji="0" lang="en-US" altLang="en-US" sz="1600" b="0" i="0" u="none" strike="noStrike" cap="none" normalizeH="0" baseline="0" dirty="0" smtClean="0">
+                <a:ln>
+                  <a:noFill/>
+                </a:ln>
+                <a:solidFill>
+                  <a:srgbClr val="212121"/>
+                </a:solidFill>
+                <a:effectLst/>
+                <a:latin typeface="Arial" panose="020B0604020202020204" pitchFamily="34" charset="0"/>
+                <a:cs typeface="Arial" panose="020B0604020202020204" pitchFamily="34" charset="0"/>
+              </a:rPr>
+              <a:t>C:\Particle\Toolchain\MinGW</a:t>
+            </a:r>
+            <a:br>
+              <a:rPr kumimoji="0" lang="en-US" altLang="en-US" sz="1600" b="0" i="0" u="none" strike="noStrike" cap="none" normalizeH="0" baseline="0" dirty="0" smtClean="0">
+                <a:ln>
+                  <a:noFill/>
+                </a:ln>
+                <a:solidFill>
+                  <a:srgbClr val="212121"/>
+                </a:solidFill>
+                <a:effectLst/>
+                <a:latin typeface="Arial" panose="020B0604020202020204" pitchFamily="34" charset="0"/>
+                <a:cs typeface="Arial" panose="020B0604020202020204" pitchFamily="34" charset="0"/>
+              </a:rPr>
+            </a:br>
+            <a:r>
+              <a:rPr kumimoji="0" lang="en-US" altLang="en-US" sz="1600" b="0" i="0" u="none" strike="noStrike" cap="none" normalizeH="0" baseline="0" dirty="0" smtClean="0">
+                <a:ln>
+                  <a:noFill/>
+                </a:ln>
+                <a:solidFill>
+                  <a:srgbClr val="212121"/>
+                </a:solidFill>
+                <a:effectLst/>
+                <a:latin typeface="Arial" panose="020B0604020202020204" pitchFamily="34" charset="0"/>
+                <a:cs typeface="Arial" panose="020B0604020202020204" pitchFamily="34" charset="0"/>
+              </a:rPr>
+              <a:t>C:\Particle\Toolchain\MinGW\msys\1.0\bin</a:t>
+            </a:r>
+            <a:br>
+              <a:rPr kumimoji="0" lang="en-US" altLang="en-US" sz="1600" b="0" i="0" u="none" strike="noStrike" cap="none" normalizeH="0" baseline="0" dirty="0" smtClean="0">
+                <a:ln>
+                  <a:noFill/>
+                </a:ln>
+                <a:solidFill>
+                  <a:srgbClr val="212121"/>
+                </a:solidFill>
+                <a:effectLst/>
+                <a:latin typeface="Arial" panose="020B0604020202020204" pitchFamily="34" charset="0"/>
+                <a:cs typeface="Arial" panose="020B0604020202020204" pitchFamily="34" charset="0"/>
+              </a:rPr>
+            </a:br>
+            <a:r>
+              <a:rPr kumimoji="0" lang="en-US" altLang="en-US" sz="1600" b="0" i="0" u="none" strike="noStrike" cap="none" normalizeH="0" baseline="0" dirty="0" smtClean="0">
+                <a:ln>
+                  <a:noFill/>
+                </a:ln>
+                <a:solidFill>
+                  <a:srgbClr val="212121"/>
+                </a:solidFill>
+                <a:effectLst/>
+                <a:latin typeface="Arial" panose="020B0604020202020204" pitchFamily="34" charset="0"/>
+                <a:cs typeface="Arial" panose="020B0604020202020204" pitchFamily="34" charset="0"/>
+              </a:rPr>
+              <a:t>C:\Particle\Toolchain\GCC-ARM\bin</a:t>
+            </a:r>
+            <a:br>
+              <a:rPr kumimoji="0" lang="en-US" altLang="en-US" sz="1600" b="0" i="0" u="none" strike="noStrike" cap="none" normalizeH="0" baseline="0" dirty="0" smtClean="0">
+                <a:ln>
+                  <a:noFill/>
+                </a:ln>
+                <a:solidFill>
+                  <a:srgbClr val="212121"/>
+                </a:solidFill>
+                <a:effectLst/>
+                <a:latin typeface="Arial" panose="020B0604020202020204" pitchFamily="34" charset="0"/>
+                <a:cs typeface="Arial" panose="020B0604020202020204" pitchFamily="34" charset="0"/>
+              </a:rPr>
+            </a:br>
+            <a:r>
+              <a:rPr kumimoji="0" lang="en-US" altLang="en-US" sz="1600" b="0" i="0" u="none" strike="noStrike" cap="none" normalizeH="0" baseline="0" dirty="0" smtClean="0">
+                <a:ln>
+                  <a:noFill/>
+                </a:ln>
+                <a:solidFill>
+                  <a:srgbClr val="212121"/>
+                </a:solidFill>
+                <a:effectLst/>
+                <a:latin typeface="Arial" panose="020B0604020202020204" pitchFamily="34" charset="0"/>
+                <a:cs typeface="Arial" panose="020B0604020202020204" pitchFamily="34" charset="0"/>
+              </a:rPr>
+              <a:t>C:\Particle\Tools\DFU-util</a:t>
+            </a:r>
+            <a:br>
+              <a:rPr kumimoji="0" lang="en-US" altLang="en-US" sz="1600" b="0" i="0" u="none" strike="noStrike" cap="none" normalizeH="0" baseline="0" dirty="0" smtClean="0">
+                <a:ln>
+                  <a:noFill/>
+                </a:ln>
+                <a:solidFill>
+                  <a:srgbClr val="212121"/>
+                </a:solidFill>
+                <a:effectLst/>
+                <a:latin typeface="Arial" panose="020B0604020202020204" pitchFamily="34" charset="0"/>
+                <a:cs typeface="Arial" panose="020B0604020202020204" pitchFamily="34" charset="0"/>
+              </a:rPr>
+            </a:br>
+            <a:r>
+              <a:rPr kumimoji="0" lang="en-US" altLang="en-US" sz="1600" b="0" i="0" u="none" strike="noStrike" cap="none" normalizeH="0" baseline="0" dirty="0" smtClean="0">
+                <a:ln>
+                  <a:noFill/>
+                </a:ln>
+                <a:solidFill>
+                  <a:srgbClr val="212121"/>
+                </a:solidFill>
+                <a:effectLst/>
+                <a:latin typeface="Arial" panose="020B0604020202020204" pitchFamily="34" charset="0"/>
+                <a:cs typeface="Arial" panose="020B0604020202020204" pitchFamily="34" charset="0"/>
+              </a:rPr>
+              <a:t>C:\dfu-util-0.8-binaries\win32-mingw32</a:t>
+            </a:r>
+            <a:br>
+              <a:rPr kumimoji="0" lang="en-US" altLang="en-US" sz="1600" b="0" i="0" u="none" strike="noStrike" cap="none" normalizeH="0" baseline="0" dirty="0" smtClean="0">
+                <a:ln>
+                  <a:noFill/>
+                </a:ln>
+                <a:solidFill>
+                  <a:srgbClr val="212121"/>
+                </a:solidFill>
+                <a:effectLst/>
+                <a:latin typeface="Arial" panose="020B0604020202020204" pitchFamily="34" charset="0"/>
+                <a:cs typeface="Arial" panose="020B0604020202020204" pitchFamily="34" charset="0"/>
+              </a:rPr>
+            </a:br>
+            <a:r>
+              <a:rPr kumimoji="0" lang="en-US" altLang="en-US" sz="1600" b="0" i="0" u="none" strike="noStrike" cap="none" normalizeH="0" baseline="0" dirty="0" smtClean="0">
+                <a:ln>
+                  <a:noFill/>
+                </a:ln>
+                <a:solidFill>
+                  <a:srgbClr val="212121"/>
+                </a:solidFill>
+                <a:effectLst/>
+                <a:latin typeface="Arial" panose="020B0604020202020204" pitchFamily="34" charset="0"/>
+                <a:cs typeface="Arial" panose="020B0604020202020204" pitchFamily="34" charset="0"/>
+              </a:rPr>
+              <a:t>C:\Users\Dave\AppData\Local\Microsoft\WindowsApps</a:t>
+            </a:r>
+            <a:br>
+              <a:rPr kumimoji="0" lang="en-US" altLang="en-US" sz="1600" b="0" i="0" u="none" strike="noStrike" cap="none" normalizeH="0" baseline="0" dirty="0" smtClean="0">
+                <a:ln>
+                  <a:noFill/>
+                </a:ln>
+                <a:solidFill>
+                  <a:srgbClr val="212121"/>
+                </a:solidFill>
+                <a:effectLst/>
+                <a:latin typeface="Arial" panose="020B0604020202020204" pitchFamily="34" charset="0"/>
+                <a:cs typeface="Arial" panose="020B0604020202020204" pitchFamily="34" charset="0"/>
+              </a:rPr>
+            </a:br>
+            <a:r>
+              <a:rPr kumimoji="0" lang="en-US" altLang="en-US" sz="1600" b="0" i="0" u="none" strike="noStrike" cap="none" normalizeH="0" baseline="0" dirty="0" smtClean="0">
+                <a:ln>
+                  <a:noFill/>
+                </a:ln>
+                <a:solidFill>
+                  <a:srgbClr val="212121"/>
+                </a:solidFill>
+                <a:effectLst/>
+                <a:latin typeface="Arial" panose="020B0604020202020204" pitchFamily="34" charset="0"/>
+                <a:cs typeface="Arial" panose="020B0604020202020204" pitchFamily="34" charset="0"/>
+              </a:rPr>
+              <a:t>C:\Program Files (x86)\Microsoft VS Code\bin</a:t>
+            </a:r>
+            <a:br>
+              <a:rPr kumimoji="0" lang="en-US" altLang="en-US" sz="1600" b="0" i="0" u="none" strike="noStrike" cap="none" normalizeH="0" baseline="0" dirty="0" smtClean="0">
+                <a:ln>
+                  <a:noFill/>
+                </a:ln>
+                <a:solidFill>
+                  <a:srgbClr val="212121"/>
+                </a:solidFill>
+                <a:effectLst/>
+                <a:latin typeface="Arial" panose="020B0604020202020204" pitchFamily="34" charset="0"/>
+                <a:cs typeface="Arial" panose="020B0604020202020204" pitchFamily="34" charset="0"/>
+              </a:rPr>
+            </a:br>
+            <a:r>
+              <a:rPr kumimoji="0" lang="en-US" altLang="en-US" sz="1600" b="0" i="0" u="none" strike="noStrike" cap="none" normalizeH="0" baseline="0" dirty="0" smtClean="0">
+                <a:ln>
+                  <a:noFill/>
+                </a:ln>
+                <a:solidFill>
+                  <a:srgbClr val="212121"/>
+                </a:solidFill>
+                <a:effectLst/>
+                <a:latin typeface="Arial" panose="020B0604020202020204" pitchFamily="34" charset="0"/>
+                <a:cs typeface="Arial" panose="020B0604020202020204" pitchFamily="34" charset="0"/>
+              </a:rPr>
+              <a:t>C:\Users\Dave\AppData\Local\atom\bin</a:t>
+            </a:r>
+            <a:br>
+              <a:rPr kumimoji="0" lang="en-US" altLang="en-US" sz="1600" b="0" i="0" u="none" strike="noStrike" cap="none" normalizeH="0" baseline="0" dirty="0" smtClean="0">
+                <a:ln>
+                  <a:noFill/>
+                </a:ln>
+                <a:solidFill>
+                  <a:srgbClr val="212121"/>
+                </a:solidFill>
+                <a:effectLst/>
+                <a:latin typeface="Arial" panose="020B0604020202020204" pitchFamily="34" charset="0"/>
+                <a:cs typeface="Arial" panose="020B0604020202020204" pitchFamily="34" charset="0"/>
+              </a:rPr>
+            </a:br>
+            <a:r>
+              <a:rPr kumimoji="0" lang="en-US" altLang="en-US" sz="1600" b="0" i="0" u="none" strike="noStrike" cap="none" normalizeH="0" baseline="0" dirty="0" smtClean="0">
+                <a:ln>
+                  <a:noFill/>
+                </a:ln>
+                <a:solidFill>
+                  <a:srgbClr val="212121"/>
+                </a:solidFill>
+                <a:effectLst/>
+                <a:latin typeface="Arial" panose="020B0604020202020204" pitchFamily="34" charset="0"/>
+                <a:cs typeface="Arial" panose="020B0604020202020204" pitchFamily="34" charset="0"/>
+              </a:rPr>
+              <a:t>C:\Program Files (x86)\GnuWin32\bin</a:t>
+            </a:r>
+            <a:br>
+              <a:rPr kumimoji="0" lang="en-US" altLang="en-US" sz="1600" b="0" i="0" u="none" strike="noStrike" cap="none" normalizeH="0" baseline="0" dirty="0" smtClean="0">
+                <a:ln>
+                  <a:noFill/>
+                </a:ln>
+                <a:solidFill>
+                  <a:srgbClr val="212121"/>
+                </a:solidFill>
+                <a:effectLst/>
+                <a:latin typeface="Arial" panose="020B0604020202020204" pitchFamily="34" charset="0"/>
+                <a:cs typeface="Arial" panose="020B0604020202020204" pitchFamily="34" charset="0"/>
+              </a:rPr>
+            </a:br>
+            <a:r>
+              <a:rPr kumimoji="0" lang="en-US" altLang="en-US" sz="1600" b="0" i="0" u="none" strike="noStrike" cap="none" normalizeH="0" baseline="0" dirty="0" smtClean="0">
+                <a:ln>
+                  <a:noFill/>
+                </a:ln>
+                <a:solidFill>
+                  <a:srgbClr val="212121"/>
+                </a:solidFill>
+                <a:effectLst/>
+                <a:latin typeface="Arial" panose="020B0604020202020204" pitchFamily="34" charset="0"/>
+                <a:cs typeface="Arial" panose="020B0604020202020204" pitchFamily="34" charset="0"/>
+              </a:rPr>
+              <a:t>C:\MinGW\msys\1.0\bin</a:t>
+            </a:r>
+            <a:br>
+              <a:rPr kumimoji="0" lang="en-US" altLang="en-US" sz="1600" b="0" i="0" u="none" strike="noStrike" cap="none" normalizeH="0" baseline="0" dirty="0" smtClean="0">
+                <a:ln>
+                  <a:noFill/>
+                </a:ln>
+                <a:solidFill>
+                  <a:srgbClr val="212121"/>
+                </a:solidFill>
+                <a:effectLst/>
+                <a:latin typeface="Arial" panose="020B0604020202020204" pitchFamily="34" charset="0"/>
+                <a:cs typeface="Arial" panose="020B0604020202020204" pitchFamily="34" charset="0"/>
+              </a:rPr>
+            </a:br>
+            <a:r>
+              <a:rPr kumimoji="0" lang="en-US" altLang="en-US" sz="1600" b="0" i="0" u="none" strike="noStrike" cap="none" normalizeH="0" baseline="0" dirty="0" smtClean="0">
+                <a:ln>
+                  <a:noFill/>
+                </a:ln>
+                <a:solidFill>
+                  <a:srgbClr val="212121"/>
+                </a:solidFill>
+                <a:effectLst/>
+                <a:latin typeface="Arial" panose="020B0604020202020204" pitchFamily="34" charset="0"/>
+                <a:cs typeface="Arial" panose="020B0604020202020204" pitchFamily="34" charset="0"/>
+              </a:rPr>
+              <a:t>C:\Particle\Tools\Git\bin</a:t>
+            </a:r>
+            <a:endParaRPr kumimoji="0" lang="en-US" altLang="en-US" sz="4000" b="0" i="0" u="none" strike="noStrike" cap="none" normalizeH="0" baseline="0" dirty="0" smtClean="0">
+              <a:ln>
+                <a:noFill/>
+              </a:ln>
               <a:solidFill>
-                <a:srgbClr val="FF0000"/>
+                <a:schemeClr val="tx1"/>
               </a:solidFill>
+              <a:effectLst/>
+              <a:latin typeface="Arial" panose="020B0604020202020204" pitchFamily="34" charset="0"/>
             </a:endParaRPr>
           </a:p>
         </p:txBody>
@@ -5992,7 +6145,7 @@
     </p:spTree>
     <p:extLst>
       <p:ext uri="{BB962C8B-B14F-4D97-AF65-F5344CB8AC3E}">
-        <p14:creationId xmlns:p14="http://schemas.microsoft.com/office/powerpoint/2010/main" val="65709953"/>
+        <p14:creationId xmlns:p14="http://schemas.microsoft.com/office/powerpoint/2010/main" val="1114178262"/>
       </p:ext>
     </p:extLst>
   </p:cSld>
@@ -6036,59 +6189,74 @@
           <a:p>
             <a:r>
               <a:rPr lang="en-US" dirty="0"/>
-              <a:t>Step 7: Install </a:t>
-            </a:r>
-            <a:r>
-              <a:rPr lang="en-US" dirty="0" err="1"/>
-              <a:t>CoolTerm</a:t>
-            </a:r>
-            <a:r>
-              <a:rPr lang="en-US" dirty="0"/>
-              <a:t> USB </a:t>
+              <a:t>Step 6: Install Particle Firmware</a:t>
             </a:r>
           </a:p>
         </p:txBody>
       </p:sp>
       <p:sp>
         <p:nvSpPr>
-          <p:cNvPr id="3" name="Content Placeholder 2"/>
-          <p:cNvSpPr>
-            <a:spLocks noGrp="1"/>
-          </p:cNvSpPr>
-          <p:nvPr>
-            <p:ph idx="1"/>
-          </p:nvPr>
+          <p:cNvPr id="5" name="Rectangle 4"/>
+          <p:cNvSpPr/>
+          <p:nvPr/>
         </p:nvSpPr>
         <p:spPr>
           <a:xfrm>
-            <a:off x="342900" y="1285336"/>
-            <a:ext cx="8459788" cy="4678901"/>
-          </a:xfrm>
+            <a:off x="904875" y="1118741"/>
+            <a:ext cx="6429375" cy="584775"/>
+          </a:xfrm>
+          <a:prstGeom prst="rect">
+            <a:avLst/>
+          </a:prstGeom>
         </p:spPr>
         <p:txBody>
-          <a:bodyPr/>
+          <a:bodyPr wrap="square">
+            <a:spAutoFit/>
+          </a:bodyPr>
           <a:lstStyle/>
           <a:p>
             <a:r>
-              <a:rPr lang="en-US" sz="2000" dirty="0"/>
-              <a:t>Link to install: </a:t>
-            </a:r>
-            <a:r>
-              <a:rPr lang="en-US" sz="2000" dirty="0">
+              <a:rPr lang="en-US" dirty="0">
                 <a:hlinkClick r:id="rId2"/>
               </a:rPr>
-              <a:t>http://freeware.the-meiers.org/CoolTerm_Win.zip</a:t>
-            </a:r>
-            <a:endParaRPr lang="en-US" sz="2000" dirty="0"/>
-          </a:p>
-          <a:p>
-            <a:endParaRPr lang="en-US" sz="2000" dirty="0"/>
+              <a:t>https://github.com/spark/firmware</a:t>
+            </a:r>
+            <a:endParaRPr lang="en-US" dirty="0"/>
+          </a:p>
+        </p:txBody>
+      </p:sp>
+      <p:sp>
+        <p:nvSpPr>
+          <p:cNvPr id="6" name="TextBox 5"/>
+          <p:cNvSpPr txBox="1"/>
+          <p:nvPr/>
+        </p:nvSpPr>
+        <p:spPr>
+          <a:xfrm>
+            <a:off x="1213585" y="718478"/>
+            <a:ext cx="1646285" cy="400110"/>
+          </a:xfrm>
+          <a:prstGeom prst="rect">
+            <a:avLst/>
+          </a:prstGeom>
+          <a:noFill/>
+        </p:spPr>
+        <p:txBody>
+          <a:bodyPr wrap="none" rtlCol="0">
+            <a:spAutoFit/>
+          </a:bodyPr>
+          <a:lstStyle/>
+          <a:p>
+            <a:r>
+              <a:rPr lang="en-US" sz="2000" i="1" dirty="0"/>
+              <a:t>Get the latest</a:t>
+            </a:r>
           </a:p>
         </p:txBody>
       </p:sp>
       <p:pic>
         <p:nvPicPr>
-          <p:cNvPr id="76802" name="Picture 2"/>
+          <p:cNvPr id="6146" name="Picture 2"/>
           <p:cNvPicPr>
             <a:picLocks noChangeAspect="1" noChangeArrowheads="1"/>
           </p:cNvPicPr>
@@ -6109,8 +6277,8 @@
         </p:blipFill>
         <p:spPr bwMode="auto">
           <a:xfrm>
-            <a:off x="3101735" y="1949523"/>
-            <a:ext cx="2940529" cy="2247404"/>
+            <a:off x="352425" y="1703516"/>
+            <a:ext cx="5257800" cy="2230425"/>
           </a:xfrm>
           <a:prstGeom prst="rect">
             <a:avLst/>
@@ -6142,18 +6310,106 @@
       </p:pic>
       <p:sp>
         <p:nvSpPr>
-          <p:cNvPr id="4" name="Rectangle 3"/>
+          <p:cNvPr id="8" name="Rectangle 7"/>
           <p:cNvSpPr/>
           <p:nvPr/>
         </p:nvSpPr>
         <p:spPr>
           <a:xfrm>
-            <a:off x="1997015" y="4403939"/>
-            <a:ext cx="5149970" cy="707886"/>
+            <a:off x="4696045" y="3676649"/>
+            <a:ext cx="990380" cy="171451"/>
           </a:xfrm>
           <a:prstGeom prst="rect">
             <a:avLst/>
           </a:prstGeom>
+          <a:noFill/>
+          <a:ln>
+            <a:solidFill>
+              <a:schemeClr val="bg2"/>
+            </a:solidFill>
+          </a:ln>
+        </p:spPr>
+        <p:style>
+          <a:lnRef idx="2">
+            <a:schemeClr val="accent1">
+              <a:shade val="50000"/>
+            </a:schemeClr>
+          </a:lnRef>
+          <a:fillRef idx="1">
+            <a:schemeClr val="accent1"/>
+          </a:fillRef>
+          <a:effectRef idx="0">
+            <a:schemeClr val="accent1"/>
+          </a:effectRef>
+          <a:fontRef idx="minor">
+            <a:schemeClr val="lt1"/>
+          </a:fontRef>
+        </p:style>
+        <p:txBody>
+          <a:bodyPr rtlCol="0" anchor="ctr"/>
+          <a:lstStyle/>
+          <a:p>
+            <a:pPr algn="ctr"/>
+            <a:endParaRPr lang="en-US"/>
+          </a:p>
+        </p:txBody>
+      </p:sp>
+      <p:cxnSp>
+        <p:nvCxnSpPr>
+          <p:cNvPr id="9" name="Straight Arrow Connector 8"/>
+          <p:cNvCxnSpPr>
+            <a:endCxn id="8" idx="3"/>
+          </p:cNvCxnSpPr>
+          <p:nvPr/>
+        </p:nvCxnSpPr>
+        <p:spPr>
+          <a:xfrm flipH="1">
+            <a:off x="5686425" y="2190750"/>
+            <a:ext cx="1191292" cy="1571625"/>
+          </a:xfrm>
+          <a:prstGeom prst="straightConnector1">
+            <a:avLst/>
+          </a:prstGeom>
+          <a:ln>
+            <a:solidFill>
+              <a:schemeClr val="bg2"/>
+            </a:solidFill>
+            <a:headEnd type="none" w="med" len="med"/>
+            <a:tailEnd type="triangle" w="med" len="med"/>
+          </a:ln>
+        </p:spPr>
+        <p:style>
+          <a:lnRef idx="1">
+            <a:schemeClr val="accent1"/>
+          </a:lnRef>
+          <a:fillRef idx="0">
+            <a:schemeClr val="accent1"/>
+          </a:fillRef>
+          <a:effectRef idx="0">
+            <a:schemeClr val="accent1"/>
+          </a:effectRef>
+          <a:fontRef idx="minor">
+            <a:schemeClr val="tx1"/>
+          </a:fontRef>
+        </p:style>
+      </p:cxnSp>
+      <p:sp>
+        <p:nvSpPr>
+          <p:cNvPr id="10" name="Rectangle 9"/>
+          <p:cNvSpPr/>
+          <p:nvPr/>
+        </p:nvSpPr>
+        <p:spPr>
+          <a:xfrm>
+            <a:off x="6220545" y="1898362"/>
+            <a:ext cx="1695010" cy="584775"/>
+          </a:xfrm>
+          <a:prstGeom prst="rect">
+            <a:avLst/>
+          </a:prstGeom>
+          <a:solidFill>
+            <a:schemeClr val="bg1"/>
+          </a:solidFill>
         </p:spPr>
         <p:txBody>
           <a:bodyPr wrap="square">
@@ -6162,16 +6418,213 @@
           <a:lstStyle/>
           <a:p>
             <a:r>
-              <a:rPr lang="en-US" sz="2000" dirty="0"/>
-              <a:t>Unzip and copy “CoolTerm_0.stc” in this folder to the desktop for easy starting of USB</a:t>
-            </a:r>
+              <a:rPr lang="en-US" sz="1600" dirty="0"/>
+              <a:t>Click “Download ZIP</a:t>
+            </a:r>
+            <a:r>
+              <a:rPr lang="en-US" sz="1600" dirty="0" smtClean="0"/>
+              <a:t>”</a:t>
+            </a:r>
+            <a:endParaRPr lang="en-US" sz="1600" dirty="0"/>
+          </a:p>
+        </p:txBody>
+      </p:sp>
+      <p:pic>
+        <p:nvPicPr>
+          <p:cNvPr id="6147" name="Picture 3"/>
+          <p:cNvPicPr>
+            <a:picLocks noChangeAspect="1" noChangeArrowheads="1"/>
+          </p:cNvPicPr>
+          <p:nvPr/>
+        </p:nvPicPr>
+        <p:blipFill>
+          <a:blip r:embed="rId4">
+            <a:extLst>
+              <a:ext uri="{28A0092B-C50C-407E-A947-70E740481C1C}">
+                <a14:useLocalDpi xmlns:a14="http://schemas.microsoft.com/office/drawing/2010/main" val="0"/>
+              </a:ext>
+            </a:extLst>
+          </a:blip>
+          <a:srcRect/>
+          <a:stretch>
+            <a:fillRect/>
+          </a:stretch>
+        </p:blipFill>
+        <p:spPr bwMode="auto">
+          <a:xfrm>
+            <a:off x="904875" y="4457700"/>
+            <a:ext cx="2857500" cy="1828800"/>
+          </a:xfrm>
+          <a:prstGeom prst="rect">
+            <a:avLst/>
+          </a:prstGeom>
+          <a:noFill/>
+          <a:ln>
+            <a:noFill/>
+          </a:ln>
+          <a:extLst>
+            <a:ext uri="{909E8E84-426E-40DD-AFC4-6F175D3DCCD1}">
+              <a14:hiddenFill xmlns:a14="http://schemas.microsoft.com/office/drawing/2010/main">
+                <a:solidFill>
+                  <a:schemeClr val="accent1"/>
+                </a:solidFill>
+              </a14:hiddenFill>
+            </a:ext>
+            <a:ext uri="{91240B29-F687-4F45-9708-019B960494DF}">
+              <a14:hiddenLine xmlns:a14="http://schemas.microsoft.com/office/drawing/2010/main" w="9525">
+                <a:solidFill>
+                  <a:schemeClr val="tx1"/>
+                </a:solidFill>
+                <a:miter lim="800000"/>
+                <a:headEnd/>
+                <a:tailEnd/>
+              </a14:hiddenLine>
+            </a:ext>
+          </a:extLst>
+        </p:spPr>
+      </p:pic>
+      <p:cxnSp>
+        <p:nvCxnSpPr>
+          <p:cNvPr id="13" name="Straight Arrow Connector 12"/>
+          <p:cNvCxnSpPr/>
+          <p:nvPr/>
+        </p:nvCxnSpPr>
+        <p:spPr>
+          <a:xfrm flipH="1">
+            <a:off x="2981325" y="4457700"/>
+            <a:ext cx="1247775" cy="1009650"/>
+          </a:xfrm>
+          <a:prstGeom prst="straightConnector1">
+            <a:avLst/>
+          </a:prstGeom>
+          <a:ln>
+            <a:solidFill>
+              <a:schemeClr val="bg2"/>
+            </a:solidFill>
+            <a:headEnd type="none" w="med" len="med"/>
+            <a:tailEnd type="triangle" w="med" len="med"/>
+          </a:ln>
+        </p:spPr>
+        <p:style>
+          <a:lnRef idx="1">
+            <a:schemeClr val="accent1"/>
+          </a:lnRef>
+          <a:fillRef idx="0">
+            <a:schemeClr val="accent1"/>
+          </a:fillRef>
+          <a:effectRef idx="0">
+            <a:schemeClr val="accent1"/>
+          </a:effectRef>
+          <a:fontRef idx="minor">
+            <a:schemeClr val="tx1"/>
+          </a:fontRef>
+        </p:style>
+      </p:cxnSp>
+      <p:sp>
+        <p:nvSpPr>
+          <p:cNvPr id="16" name="Rectangle 15"/>
+          <p:cNvSpPr/>
+          <p:nvPr/>
+        </p:nvSpPr>
+        <p:spPr>
+          <a:xfrm>
+            <a:off x="4419820" y="3968174"/>
+            <a:ext cx="1695010" cy="584775"/>
+          </a:xfrm>
+          <a:prstGeom prst="rect">
+            <a:avLst/>
+          </a:prstGeom>
+          <a:solidFill>
+            <a:schemeClr val="bg1"/>
+          </a:solidFill>
+        </p:spPr>
+        <p:txBody>
+          <a:bodyPr wrap="square">
+            <a:spAutoFit/>
+          </a:bodyPr>
+          <a:lstStyle/>
+          <a:p>
+            <a:r>
+              <a:rPr lang="en-US" sz="1600" dirty="0"/>
+              <a:t>Extract to GitHub Folder</a:t>
+            </a:r>
+          </a:p>
+        </p:txBody>
+      </p:sp>
+      <p:sp>
+        <p:nvSpPr>
+          <p:cNvPr id="12" name="Rectangle 11"/>
+          <p:cNvSpPr/>
+          <p:nvPr/>
+        </p:nvSpPr>
+        <p:spPr>
+          <a:xfrm>
+            <a:off x="6486745" y="3491745"/>
+            <a:ext cx="2085975" cy="1754326"/>
+          </a:xfrm>
+          <a:prstGeom prst="rect">
+            <a:avLst/>
+          </a:prstGeom>
+          <a:solidFill>
+            <a:schemeClr val="bg1"/>
+          </a:solidFill>
+        </p:spPr>
+        <p:txBody>
+          <a:bodyPr wrap="square">
+            <a:spAutoFit/>
+          </a:bodyPr>
+          <a:lstStyle/>
+          <a:p>
+            <a:r>
+              <a:rPr lang="en-US" sz="1800" i="1" dirty="0" smtClean="0">
+                <a:solidFill>
+                  <a:srgbClr val="FF0000"/>
+                </a:solidFill>
+              </a:rPr>
+              <a:t>If cloning get latest “release”</a:t>
+            </a:r>
+          </a:p>
+          <a:p>
+            <a:r>
+              <a:rPr lang="en-US" sz="1800" i="1" dirty="0" smtClean="0">
+                <a:solidFill>
+                  <a:srgbClr val="FF0000"/>
+                </a:solidFill>
+              </a:rPr>
+              <a:t>I got branch: “release/v0.6.2”</a:t>
+            </a:r>
+          </a:p>
+          <a:p>
+            <a:r>
+              <a:rPr lang="en-US" sz="1800" i="1" dirty="0" smtClean="0">
+                <a:solidFill>
+                  <a:srgbClr val="FF0000"/>
+                </a:solidFill>
+              </a:rPr>
+              <a:t>Xxx </a:t>
+            </a:r>
+          </a:p>
+          <a:p>
+            <a:r>
+              <a:rPr lang="en-US" sz="1800" i="1" dirty="0" smtClean="0">
+                <a:solidFill>
+                  <a:srgbClr val="FF0000"/>
+                </a:solidFill>
+              </a:rPr>
+              <a:t>“develop”</a:t>
+            </a:r>
+            <a:endParaRPr lang="en-US" sz="1800" i="1" dirty="0">
+              <a:solidFill>
+                <a:srgbClr val="FF0000"/>
+              </a:solidFill>
+            </a:endParaRPr>
           </a:p>
         </p:txBody>
       </p:sp>
     </p:spTree>
     <p:extLst>
       <p:ext uri="{BB962C8B-B14F-4D97-AF65-F5344CB8AC3E}">
-        <p14:creationId xmlns:p14="http://schemas.microsoft.com/office/powerpoint/2010/main" val="3304303483"/>
+        <p14:creationId xmlns:p14="http://schemas.microsoft.com/office/powerpoint/2010/main" val="65709953"/>
       </p:ext>
     </p:extLst>
   </p:cSld>
@@ -6215,21 +6668,120 @@
           <a:p>
             <a:r>
               <a:rPr lang="en-US" dirty="0"/>
-              <a:t>Step 8:   Make Firmware</a:t>
+              <a:t>Step 7: Install </a:t>
+            </a:r>
+            <a:r>
+              <a:rPr lang="en-US" dirty="0" err="1"/>
+              <a:t>CoolTerm</a:t>
+            </a:r>
+            <a:r>
+              <a:rPr lang="en-US" dirty="0"/>
+              <a:t> USB </a:t>
             </a:r>
           </a:p>
         </p:txBody>
       </p:sp>
       <p:sp>
         <p:nvSpPr>
-          <p:cNvPr id="8" name="Rectangle 7"/>
+          <p:cNvPr id="3" name="Content Placeholder 2"/>
+          <p:cNvSpPr>
+            <a:spLocks noGrp="1"/>
+          </p:cNvSpPr>
+          <p:nvPr>
+            <p:ph idx="1"/>
+          </p:nvPr>
+        </p:nvSpPr>
+        <p:spPr>
+          <a:xfrm>
+            <a:off x="342900" y="1285336"/>
+            <a:ext cx="8459788" cy="4678901"/>
+          </a:xfrm>
+        </p:spPr>
+        <p:txBody>
+          <a:bodyPr/>
+          <a:lstStyle/>
+          <a:p>
+            <a:r>
+              <a:rPr lang="en-US" sz="2000" dirty="0"/>
+              <a:t>Link to install: </a:t>
+            </a:r>
+            <a:r>
+              <a:rPr lang="en-US" sz="2000" dirty="0">
+                <a:hlinkClick r:id="rId2"/>
+              </a:rPr>
+              <a:t>http://freeware.the-meiers.org/CoolTerm_Win.zip</a:t>
+            </a:r>
+            <a:endParaRPr lang="en-US" sz="2000" dirty="0"/>
+          </a:p>
+          <a:p>
+            <a:endParaRPr lang="en-US" sz="2000" dirty="0"/>
+          </a:p>
+        </p:txBody>
+      </p:sp>
+      <p:pic>
+        <p:nvPicPr>
+          <p:cNvPr id="76802" name="Picture 2"/>
+          <p:cNvPicPr>
+            <a:picLocks noChangeAspect="1" noChangeArrowheads="1"/>
+          </p:cNvPicPr>
+          <p:nvPr/>
+        </p:nvPicPr>
+        <p:blipFill>
+          <a:blip r:embed="rId3">
+            <a:extLst>
+              <a:ext uri="{28A0092B-C50C-407E-A947-70E740481C1C}">
+                <a14:useLocalDpi xmlns:a14="http://schemas.microsoft.com/office/drawing/2010/main" val="0"/>
+              </a:ext>
+            </a:extLst>
+          </a:blip>
+          <a:srcRect/>
+          <a:stretch>
+            <a:fillRect/>
+          </a:stretch>
+        </p:blipFill>
+        <p:spPr bwMode="auto">
+          <a:xfrm>
+            <a:off x="3101735" y="1949523"/>
+            <a:ext cx="2940529" cy="2247404"/>
+          </a:xfrm>
+          <a:prstGeom prst="rect">
+            <a:avLst/>
+          </a:prstGeom>
+          <a:noFill/>
+          <a:ln>
+            <a:noFill/>
+          </a:ln>
+          <a:extLst>
+            <a:ext uri="{909E8E84-426E-40DD-AFC4-6F175D3DCCD1}">
+              <a14:hiddenFill xmlns:a14="http://schemas.microsoft.com/office/drawing/2010/main">
+                <a:solidFill>
+                  <a:schemeClr val="accent1"/>
+                </a:solidFill>
+              </a14:hiddenFill>
+            </a:ext>
+            <a:ext uri="{91240B29-F687-4F45-9708-019B960494DF}">
+              <a14:hiddenLine xmlns:a14="http://schemas.microsoft.com/office/drawing/2010/main" w="9525">
+                <a:solidFill>
+                  <a:schemeClr val="tx1"/>
+                </a:solidFill>
+                <a:miter lim="800000"/>
+                <a:headEnd/>
+                <a:tailEnd/>
+              </a14:hiddenLine>
+            </a:ext>
+          </a:extLst>
+        </p:spPr>
+      </p:pic>
+      <p:sp>
+        <p:nvSpPr>
+          <p:cNvPr id="4" name="Rectangle 3"/>
           <p:cNvSpPr/>
           <p:nvPr/>
         </p:nvSpPr>
         <p:spPr>
           <a:xfrm>
-            <a:off x="323851" y="1249685"/>
-            <a:ext cx="8677274" cy="1938992"/>
+            <a:off x="1997015" y="4403939"/>
+            <a:ext cx="5149970" cy="707886"/>
           </a:xfrm>
           <a:prstGeom prst="rect">
             <a:avLst/>
@@ -6243,239 +6795,15 @@
           <a:p>
             <a:r>
               <a:rPr lang="en-US" sz="2000" dirty="0"/>
-              <a:t>- Open cmd.exe as </a:t>
-            </a:r>
-            <a:r>
-              <a:rPr lang="en-US" sz="2000" dirty="0">
-                <a:solidFill>
-                  <a:srgbClr val="FF0000"/>
-                </a:solidFill>
-              </a:rPr>
-              <a:t>Administrator</a:t>
-            </a:r>
-            <a:r>
-              <a:rPr lang="en-US" sz="2000" dirty="0"/>
-              <a:t>:</a:t>
-            </a:r>
-          </a:p>
-          <a:p>
-            <a:endParaRPr lang="en-US" sz="2000" dirty="0"/>
-          </a:p>
-          <a:p>
-            <a:r>
-              <a:rPr lang="en-US" sz="2000" dirty="0"/>
-              <a:t>cd “Users\210023782\Documents\GitHub\firmware\main</a:t>
-            </a:r>
-            <a:r>
-              <a:rPr lang="en-US" sz="2000" dirty="0" smtClean="0"/>
-              <a:t>”</a:t>
-            </a:r>
-          </a:p>
-          <a:p>
-            <a:r>
-              <a:rPr lang="en-US" sz="2000" dirty="0" smtClean="0"/>
-              <a:t>Or</a:t>
-            </a:r>
-          </a:p>
-          <a:p>
-            <a:r>
-              <a:rPr lang="en-US" sz="2000" dirty="0"/>
-              <a:t>c</a:t>
-            </a:r>
-            <a:r>
-              <a:rPr lang="en-US" sz="2000" dirty="0" smtClean="0"/>
-              <a:t>d “C:\Users\&lt;name&gt;\Documents\GitHub\firmware\main” #for Win10</a:t>
-            </a:r>
-            <a:endParaRPr lang="en-US" sz="2000" dirty="0"/>
-          </a:p>
-          <a:p>
-            <a:r>
-              <a:rPr lang="en-US" sz="2000" dirty="0"/>
-              <a:t>make clean all v=1 </a:t>
-            </a:r>
-          </a:p>
-        </p:txBody>
-      </p:sp>
-      <p:sp>
-        <p:nvSpPr>
-          <p:cNvPr id="6" name="Rectangle 5"/>
-          <p:cNvSpPr/>
-          <p:nvPr/>
-        </p:nvSpPr>
-        <p:spPr>
-          <a:xfrm>
-            <a:off x="4228234" y="2885181"/>
-            <a:ext cx="4695825" cy="646331"/>
-          </a:xfrm>
-          <a:prstGeom prst="rect">
-            <a:avLst/>
-          </a:prstGeom>
-        </p:spPr>
-        <p:txBody>
-          <a:bodyPr wrap="square">
-            <a:spAutoFit/>
-          </a:bodyPr>
-          <a:lstStyle/>
-          <a:p>
-            <a:r>
-              <a:rPr lang="en-US" sz="1800" dirty="0">
-                <a:solidFill>
-                  <a:srgbClr val="FF0000"/>
-                </a:solidFill>
-              </a:rPr>
-              <a:t>***If command not found, PATH not correct.  Correct and restart cmd.exe</a:t>
-            </a:r>
-          </a:p>
-        </p:txBody>
-      </p:sp>
-      <p:sp>
-        <p:nvSpPr>
-          <p:cNvPr id="13" name="Rectangle 12"/>
-          <p:cNvSpPr/>
-          <p:nvPr/>
-        </p:nvSpPr>
-        <p:spPr>
-          <a:xfrm>
-            <a:off x="246785" y="3448593"/>
-            <a:ext cx="8677274" cy="707886"/>
-          </a:xfrm>
-          <a:prstGeom prst="rect">
-            <a:avLst/>
-          </a:prstGeom>
-        </p:spPr>
-        <p:txBody>
-          <a:bodyPr wrap="square">
-            <a:spAutoFit/>
-          </a:bodyPr>
-          <a:lstStyle/>
-          <a:p>
-            <a:r>
-              <a:rPr lang="en-US" sz="2000" dirty="0"/>
-              <a:t>- Make will complain about “</a:t>
-            </a:r>
-            <a:r>
-              <a:rPr lang="en-US" sz="2000" dirty="0" err="1"/>
-              <a:t>git</a:t>
-            </a:r>
-            <a:r>
-              <a:rPr lang="en-US" sz="2000" dirty="0"/>
-              <a:t> not found” but will compile anyway.</a:t>
-            </a:r>
-          </a:p>
-          <a:p>
-            <a:r>
-              <a:rPr lang="en-US" sz="2000" dirty="0"/>
-              <a:t>- This takes about 10 </a:t>
-            </a:r>
-            <a:r>
-              <a:rPr lang="en-US" sz="2000" dirty="0" smtClean="0"/>
-              <a:t>minutes, 2 minutes in Win 10 with a SSD.</a:t>
-            </a:r>
-            <a:endParaRPr lang="en-US" sz="2000" dirty="0"/>
-          </a:p>
-        </p:txBody>
-      </p:sp>
-      <p:pic>
-        <p:nvPicPr>
-          <p:cNvPr id="4" name="Picture 3"/>
-          <p:cNvPicPr>
-            <a:picLocks noChangeAspect="1"/>
-          </p:cNvPicPr>
-          <p:nvPr/>
-        </p:nvPicPr>
-        <p:blipFill>
-          <a:blip r:embed="rId2"/>
-          <a:stretch>
-            <a:fillRect/>
-          </a:stretch>
-        </p:blipFill>
-        <p:spPr>
-          <a:xfrm>
-            <a:off x="730606" y="5124282"/>
-            <a:ext cx="7863764" cy="858687"/>
-          </a:xfrm>
-          <a:prstGeom prst="rect">
-            <a:avLst/>
-          </a:prstGeom>
-        </p:spPr>
-      </p:pic>
-      <p:sp>
-        <p:nvSpPr>
-          <p:cNvPr id="9" name="Rectangle 8"/>
-          <p:cNvSpPr/>
-          <p:nvPr/>
-        </p:nvSpPr>
-        <p:spPr>
-          <a:xfrm>
-            <a:off x="4106863" y="4200952"/>
-            <a:ext cx="4695825" cy="923330"/>
-          </a:xfrm>
-          <a:prstGeom prst="rect">
-            <a:avLst/>
-          </a:prstGeom>
-        </p:spPr>
-        <p:txBody>
-          <a:bodyPr wrap="square">
-            <a:spAutoFit/>
-          </a:bodyPr>
-          <a:lstStyle/>
-          <a:p>
-            <a:r>
-              <a:rPr lang="en-US" sz="1800" dirty="0" smtClean="0">
-                <a:solidFill>
-                  <a:srgbClr val="FF0000"/>
-                </a:solidFill>
-              </a:rPr>
-              <a:t>***</a:t>
-            </a:r>
-            <a:r>
-              <a:rPr lang="en-US" sz="1800" dirty="0" smtClean="0">
-                <a:solidFill>
-                  <a:srgbClr val="FF0000"/>
-                </a:solidFill>
-              </a:rPr>
-              <a:t>The following </a:t>
-            </a:r>
-            <a:r>
-              <a:rPr lang="en-US" sz="1800" dirty="0" smtClean="0">
-                <a:solidFill>
-                  <a:srgbClr val="FF0000"/>
-                </a:solidFill>
-              </a:rPr>
-              <a:t>message means you did not clone the latest release.  Go back to the </a:t>
-            </a:r>
-            <a:r>
-              <a:rPr lang="en-US" sz="1800" dirty="0" smtClean="0"/>
-              <a:t>Install </a:t>
-            </a:r>
-            <a:r>
-              <a:rPr lang="en-US" sz="1800" dirty="0"/>
-              <a:t>Particle </a:t>
-            </a:r>
-            <a:r>
-              <a:rPr lang="en-US" sz="1800" dirty="0" smtClean="0"/>
-              <a:t>Firmware</a:t>
-            </a:r>
-            <a:r>
-              <a:rPr lang="en-US" sz="1800" dirty="0" smtClean="0">
-                <a:solidFill>
-                  <a:srgbClr val="FF0000"/>
-                </a:solidFill>
-              </a:rPr>
-              <a:t> step.</a:t>
-            </a:r>
-            <a:endParaRPr lang="en-US" sz="1800" dirty="0">
-              <a:solidFill>
-                <a:srgbClr val="FF0000"/>
-              </a:solidFill>
-            </a:endParaRPr>
+              <a:t>Unzip and copy “CoolTerm_0.stc” in this folder to the desktop for easy starting of USB</a:t>
+            </a:r>
           </a:p>
         </p:txBody>
       </p:sp>
     </p:spTree>
     <p:extLst>
       <p:ext uri="{BB962C8B-B14F-4D97-AF65-F5344CB8AC3E}">
-        <p14:creationId xmlns:p14="http://schemas.microsoft.com/office/powerpoint/2010/main" val="238382864"/>
+        <p14:creationId xmlns:p14="http://schemas.microsoft.com/office/powerpoint/2010/main" val="3304303483"/>
       </p:ext>
     </p:extLst>
   </p:cSld>
@@ -6517,7 +6845,173 @@
           <a:bodyPr/>
           <a:lstStyle/>
           <a:p>
-            <a:endParaRPr lang="en-US"/>
+            <a:r>
+              <a:rPr lang="en-US" dirty="0"/>
+              <a:t>Step 8:   Make Firmware</a:t>
+            </a:r>
+          </a:p>
+        </p:txBody>
+      </p:sp>
+      <p:sp>
+        <p:nvSpPr>
+          <p:cNvPr id="8" name="Rectangle 7"/>
+          <p:cNvSpPr/>
+          <p:nvPr/>
+        </p:nvSpPr>
+        <p:spPr>
+          <a:xfrm>
+            <a:off x="323851" y="1249685"/>
+            <a:ext cx="8677274" cy="2246769"/>
+          </a:xfrm>
+          <a:prstGeom prst="rect">
+            <a:avLst/>
+          </a:prstGeom>
+        </p:spPr>
+        <p:txBody>
+          <a:bodyPr wrap="square">
+            <a:spAutoFit/>
+          </a:bodyPr>
+          <a:lstStyle/>
+          <a:p>
+            <a:r>
+              <a:rPr lang="en-US" sz="2000" dirty="0"/>
+              <a:t>- Open cmd.exe as </a:t>
+            </a:r>
+            <a:r>
+              <a:rPr lang="en-US" sz="2000" dirty="0">
+                <a:solidFill>
+                  <a:srgbClr val="FF0000"/>
+                </a:solidFill>
+              </a:rPr>
+              <a:t>Administrator</a:t>
+            </a:r>
+            <a:r>
+              <a:rPr lang="en-US" sz="2000" dirty="0"/>
+              <a:t>:</a:t>
+            </a:r>
+          </a:p>
+          <a:p>
+            <a:endParaRPr lang="en-US" sz="2000" dirty="0"/>
+          </a:p>
+          <a:p>
+            <a:r>
+              <a:rPr lang="en-US" sz="2000" dirty="0"/>
+              <a:t>cd “Users\210023782\Documents\GitHub\firmware\main</a:t>
+            </a:r>
+            <a:r>
+              <a:rPr lang="en-US" sz="2000" dirty="0" smtClean="0"/>
+              <a:t>”</a:t>
+            </a:r>
+          </a:p>
+          <a:p>
+            <a:r>
+              <a:rPr lang="en-US" sz="2000" dirty="0" smtClean="0"/>
+              <a:t>Or</a:t>
+            </a:r>
+          </a:p>
+          <a:p>
+            <a:r>
+              <a:rPr lang="en-US" sz="2000" dirty="0"/>
+              <a:t>c</a:t>
+            </a:r>
+            <a:r>
+              <a:rPr lang="en-US" sz="2000" dirty="0" smtClean="0"/>
+              <a:t>d “C:\Users\&lt;name&gt;\</a:t>
+            </a:r>
+            <a:r>
+              <a:rPr lang="en-US" sz="2000" dirty="0" smtClean="0"/>
+              <a:t>Documents\GitHub\firmware-develop\main</a:t>
+            </a:r>
+            <a:r>
+              <a:rPr lang="en-US" sz="2000" dirty="0" smtClean="0"/>
+              <a:t>” #for Win10</a:t>
+            </a:r>
+            <a:endParaRPr lang="en-US" sz="2000" dirty="0"/>
+          </a:p>
+          <a:p>
+            <a:r>
+              <a:rPr lang="en-US" sz="2000" dirty="0"/>
+              <a:t>make clean all v=1 </a:t>
+            </a:r>
+          </a:p>
+        </p:txBody>
+      </p:sp>
+      <p:sp>
+        <p:nvSpPr>
+          <p:cNvPr id="6" name="Rectangle 5"/>
+          <p:cNvSpPr/>
+          <p:nvPr/>
+        </p:nvSpPr>
+        <p:spPr>
+          <a:xfrm>
+            <a:off x="4228234" y="2885181"/>
+            <a:ext cx="4695825" cy="646331"/>
+          </a:xfrm>
+          <a:prstGeom prst="rect">
+            <a:avLst/>
+          </a:prstGeom>
+        </p:spPr>
+        <p:txBody>
+          <a:bodyPr wrap="square">
+            <a:spAutoFit/>
+          </a:bodyPr>
+          <a:lstStyle/>
+          <a:p>
+            <a:r>
+              <a:rPr lang="en-US" sz="1800" dirty="0">
+                <a:solidFill>
+                  <a:srgbClr val="FF0000"/>
+                </a:solidFill>
+              </a:rPr>
+              <a:t>***If command not found, PATH not correct.  Correct and restart cmd.exe</a:t>
+            </a:r>
+          </a:p>
+        </p:txBody>
+      </p:sp>
+      <p:sp>
+        <p:nvSpPr>
+          <p:cNvPr id="13" name="Rectangle 12"/>
+          <p:cNvSpPr/>
+          <p:nvPr/>
+        </p:nvSpPr>
+        <p:spPr>
+          <a:xfrm>
+            <a:off x="246785" y="3448593"/>
+            <a:ext cx="8677274" cy="707886"/>
+          </a:xfrm>
+          <a:prstGeom prst="rect">
+            <a:avLst/>
+          </a:prstGeom>
+        </p:spPr>
+        <p:txBody>
+          <a:bodyPr wrap="square">
+            <a:spAutoFit/>
+          </a:bodyPr>
+          <a:lstStyle/>
+          <a:p>
+            <a:r>
+              <a:rPr lang="en-US" sz="2000" dirty="0"/>
+              <a:t>- Make will complain about “</a:t>
+            </a:r>
+            <a:r>
+              <a:rPr lang="en-US" sz="2000" dirty="0" err="1"/>
+              <a:t>git</a:t>
+            </a:r>
+            <a:r>
+              <a:rPr lang="en-US" sz="2000" dirty="0"/>
+              <a:t> not found” but will compile anyway.</a:t>
+            </a:r>
+          </a:p>
+          <a:p>
+            <a:r>
+              <a:rPr lang="en-US" sz="2000" dirty="0"/>
+              <a:t>- This takes about 10 </a:t>
+            </a:r>
+            <a:r>
+              <a:rPr lang="en-US" sz="2000" dirty="0" smtClean="0"/>
+              <a:t>minutes, 2 minutes in Win 10 with a SSD.</a:t>
+            </a:r>
+            <a:endParaRPr lang="en-US" sz="2000" dirty="0"/>
           </a:p>
         </p:txBody>
       </p:sp>
@@ -6537,8 +7031,8 @@
         </p:blipFill>
         <p:spPr>
           <a:xfrm>
-            <a:off x="426930" y="2339779"/>
-            <a:ext cx="7763925" cy="1405725"/>
+            <a:off x="730606" y="5124282"/>
+            <a:ext cx="7863764" cy="858687"/>
           </a:xfrm>
           <a:prstGeom prst="rect">
             <a:avLst/>
@@ -6547,14 +7041,14 @@
       </p:pic>
       <p:sp>
         <p:nvSpPr>
-          <p:cNvPr id="5" name="Rectangle 4"/>
+          <p:cNvPr id="9" name="Rectangle 8"/>
           <p:cNvSpPr/>
           <p:nvPr/>
         </p:nvSpPr>
         <p:spPr>
           <a:xfrm>
-            <a:off x="766978" y="1488748"/>
-            <a:ext cx="4695825" cy="646331"/>
+            <a:off x="4106863" y="4200952"/>
+            <a:ext cx="4695825" cy="923330"/>
           </a:xfrm>
           <a:prstGeom prst="rect">
             <a:avLst/>
@@ -6572,7 +7066,19 @@
                   <a:srgbClr val="FF0000"/>
                 </a:solidFill>
               </a:rPr>
-              <a:t>***This message means you </a:t>
+              <a:t>***The following message means you did not clone the latest release.  Go back to the </a:t>
+            </a:r>
+            <a:r>
+              <a:rPr lang="en-US" sz="1800" dirty="0" smtClean="0"/>
+              <a:t>Install </a:t>
+            </a:r>
+            <a:r>
+              <a:rPr lang="en-US" sz="1800" dirty="0"/>
+              <a:t>Particle </a:t>
+            </a:r>
+            <a:r>
+              <a:rPr lang="en-US" sz="1800" dirty="0" smtClean="0"/>
+              <a:t>Firmware</a:t>
             </a:r>
             <a:r>
               <a:rPr lang="en-US" sz="1800" dirty="0" smtClean="0">
@@ -6580,7 +7086,7 @@
                   <a:srgbClr val="FF0000"/>
                 </a:solidFill>
               </a:rPr>
-              <a:t>installed wrong version of firmware from github</a:t>
+              <a:t> step.</a:t>
             </a:r>
             <a:endParaRPr lang="en-US" sz="1800" dirty="0">
               <a:solidFill>
@@ -6593,7 +7099,7 @@
     </p:spTree>
     <p:extLst>
       <p:ext uri="{BB962C8B-B14F-4D97-AF65-F5344CB8AC3E}">
-        <p14:creationId xmlns:p14="http://schemas.microsoft.com/office/powerpoint/2010/main" val="2347566030"/>
+        <p14:creationId xmlns:p14="http://schemas.microsoft.com/office/powerpoint/2010/main" val="238382864"/>
       </p:ext>
     </p:extLst>
   </p:cSld>
@@ -6636,27 +7142,47 @@
           <a:lstStyle/>
           <a:p>
             <a:r>
-              <a:rPr lang="en-US" dirty="0"/>
-              <a:t>Step 9:   Install </a:t>
-            </a:r>
-            <a:r>
-              <a:rPr lang="en-US" dirty="0" err="1"/>
-              <a:t>myWindCode</a:t>
+              <a:rPr lang="en-US" dirty="0" smtClean="0"/>
+              <a:t>FAQ</a:t>
             </a:r>
             <a:endParaRPr lang="en-US" dirty="0"/>
           </a:p>
         </p:txBody>
       </p:sp>
+      <p:pic>
+        <p:nvPicPr>
+          <p:cNvPr id="4" name="Picture 3"/>
+          <p:cNvPicPr>
+            <a:picLocks noChangeAspect="1"/>
+          </p:cNvPicPr>
+          <p:nvPr/>
+        </p:nvPicPr>
+        <p:blipFill>
+          <a:blip r:embed="rId2"/>
+          <a:stretch>
+            <a:fillRect/>
+          </a:stretch>
+        </p:blipFill>
+        <p:spPr>
+          <a:xfrm>
+            <a:off x="426930" y="2339779"/>
+            <a:ext cx="7763925" cy="1405725"/>
+          </a:xfrm>
+          <a:prstGeom prst="rect">
+            <a:avLst/>
+          </a:prstGeom>
+        </p:spPr>
+      </p:pic>
       <p:sp>
         <p:nvSpPr>
-          <p:cNvPr id="8" name="Rectangle 7"/>
+          <p:cNvPr id="5" name="Rectangle 4"/>
           <p:cNvSpPr/>
           <p:nvPr/>
         </p:nvSpPr>
         <p:spPr>
           <a:xfrm>
-            <a:off x="200026" y="1249685"/>
-            <a:ext cx="8867774" cy="5262979"/>
+            <a:off x="766978" y="1488748"/>
+            <a:ext cx="4695825" cy="646331"/>
           </a:xfrm>
           <a:prstGeom prst="rect">
             <a:avLst/>
@@ -6668,141 +7194,26 @@
           </a:bodyPr>
           <a:lstStyle/>
           <a:p>
-            <a:pPr marL="457200" indent="-457200">
-              <a:buAutoNum type="arabicPeriod"/>
-            </a:pPr>
-            <a:r>
-              <a:rPr lang="en-US" sz="2400" dirty="0"/>
-              <a:t>Using Windows Explorer copy </a:t>
-            </a:r>
-            <a:r>
-              <a:rPr lang="en-US" sz="2400" dirty="0" err="1"/>
-              <a:t>myWindCode</a:t>
-            </a:r>
-            <a:r>
-              <a:rPr lang="en-US" sz="2400" dirty="0"/>
-              <a:t> folder to </a:t>
-            </a:r>
-            <a:r>
-              <a:rPr lang="en-US" sz="2400" dirty="0" smtClean="0"/>
-              <a:t>GitHub\firmware\user\applications</a:t>
-            </a:r>
-          </a:p>
-          <a:p>
-            <a:endParaRPr lang="en-US" sz="2400" dirty="0" smtClean="0"/>
-          </a:p>
-          <a:p>
-            <a:pPr marL="800100" lvl="1" indent="-342900">
-              <a:buFont typeface="Arial" panose="020B0604020202020204" pitchFamily="34" charset="0"/>
-              <a:buChar char="•"/>
-            </a:pPr>
-            <a:r>
-              <a:rPr lang="en-US" sz="2400" dirty="0"/>
-              <a:t>	</a:t>
-            </a:r>
-            <a:r>
-              <a:rPr lang="en-US" sz="2400" dirty="0" smtClean="0"/>
-              <a:t>You could use Link Shell Extension to link the folder</a:t>
-            </a:r>
-          </a:p>
-          <a:p>
-            <a:r>
-              <a:rPr lang="en-US" sz="2400" dirty="0"/>
-              <a:t>	</a:t>
-            </a:r>
-            <a:r>
-              <a:rPr lang="en-US" sz="2400" dirty="0" smtClean="0"/>
-              <a:t>right click on GitHub\Wind\</a:t>
-            </a:r>
-            <a:r>
-              <a:rPr lang="en-US" sz="2400" dirty="0" err="1" smtClean="0"/>
-              <a:t>myWindCode</a:t>
-            </a:r>
-            <a:endParaRPr lang="en-US" sz="2400" dirty="0" smtClean="0"/>
-          </a:p>
-          <a:p>
-            <a:r>
-              <a:rPr lang="en-US" sz="2400" dirty="0"/>
-              <a:t>	</a:t>
-            </a:r>
-            <a:r>
-              <a:rPr lang="en-US" sz="2400" dirty="0" smtClean="0"/>
-              <a:t>pick link source</a:t>
-            </a:r>
-          </a:p>
-          <a:p>
-            <a:r>
-              <a:rPr lang="en-US" sz="2400" dirty="0"/>
-              <a:t>	</a:t>
-            </a:r>
-            <a:r>
-              <a:rPr lang="en-US" sz="2400" dirty="0" smtClean="0"/>
-              <a:t>browse to GitHub\firmware\user\applications</a:t>
-            </a:r>
-          </a:p>
-          <a:p>
-            <a:r>
-              <a:rPr lang="en-US" sz="2400" dirty="0"/>
-              <a:t>	</a:t>
-            </a:r>
-            <a:r>
-              <a:rPr lang="en-US" sz="2400" dirty="0" smtClean="0"/>
-              <a:t>drop as symbolic link</a:t>
-            </a:r>
-          </a:p>
-          <a:p>
-            <a:endParaRPr lang="en-US" sz="2400" dirty="0"/>
-          </a:p>
-          <a:p>
-            <a:r>
-              <a:rPr lang="en-US" sz="2400" dirty="0" smtClean="0"/>
-              <a:t>If needed, using </a:t>
-            </a:r>
-            <a:r>
-              <a:rPr lang="en-US" sz="2400" dirty="0"/>
-              <a:t>your favorite editor, add the line:</a:t>
-            </a:r>
-          </a:p>
-          <a:p>
-            <a:r>
-              <a:rPr lang="en-US" sz="2400" dirty="0"/>
-              <a:t>	#include &lt;</a:t>
-            </a:r>
-            <a:r>
-              <a:rPr lang="en-US" sz="2400" dirty="0" err="1"/>
-              <a:t>Particle.h</a:t>
-            </a:r>
-            <a:r>
-              <a:rPr lang="en-US" sz="2400" dirty="0"/>
-              <a:t>&gt; </a:t>
-            </a:r>
-          </a:p>
-          <a:p>
-            <a:r>
-              <a:rPr lang="en-US" sz="2400" dirty="0"/>
-              <a:t>	after the line #include “</a:t>
-            </a:r>
-            <a:r>
-              <a:rPr lang="en-US" sz="2400" dirty="0" err="1"/>
-              <a:t>application.h</a:t>
-            </a:r>
-            <a:r>
-              <a:rPr lang="en-US" sz="2400" dirty="0"/>
-              <a:t>”</a:t>
-            </a:r>
-          </a:p>
-          <a:p>
-            <a:endParaRPr lang="en-US" sz="2400" dirty="0"/>
-          </a:p>
-          <a:p>
-            <a:endParaRPr lang="en-US" sz="2400" dirty="0"/>
+            <a:r>
+              <a:rPr lang="en-US" sz="1800" dirty="0" smtClean="0">
+                <a:solidFill>
+                  <a:srgbClr val="FF0000"/>
+                </a:solidFill>
+              </a:rPr>
+              <a:t>***This message means you installed wrong version of firmware from github</a:t>
+            </a:r>
+            <a:endParaRPr lang="en-US" sz="1800" dirty="0">
+              <a:solidFill>
+                <a:srgbClr val="FF0000"/>
+              </a:solidFill>
+            </a:endParaRPr>
           </a:p>
         </p:txBody>
       </p:sp>
     </p:spTree>
     <p:extLst>
       <p:ext uri="{BB962C8B-B14F-4D97-AF65-F5344CB8AC3E}">
-        <p14:creationId xmlns:p14="http://schemas.microsoft.com/office/powerpoint/2010/main" val="1751966409"/>
+        <p14:creationId xmlns:p14="http://schemas.microsoft.com/office/powerpoint/2010/main" val="2347566030"/>
       </p:ext>
     </p:extLst>
   </p:cSld>
@@ -6839,6 +7250,230 @@
             <p:ph type="title"/>
           </p:nvPr>
         </p:nvSpPr>
+        <p:spPr/>
+        <p:txBody>
+          <a:bodyPr/>
+          <a:lstStyle/>
+          <a:p>
+            <a:r>
+              <a:rPr lang="en-US" dirty="0"/>
+              <a:t>Step 9:   Install </a:t>
+            </a:r>
+            <a:r>
+              <a:rPr lang="en-US" dirty="0" err="1"/>
+              <a:t>myWindCode</a:t>
+            </a:r>
+            <a:endParaRPr lang="en-US" dirty="0"/>
+          </a:p>
+        </p:txBody>
+      </p:sp>
+      <p:sp>
+        <p:nvSpPr>
+          <p:cNvPr id="8" name="Rectangle 7"/>
+          <p:cNvSpPr/>
+          <p:nvPr/>
+        </p:nvSpPr>
+        <p:spPr>
+          <a:xfrm>
+            <a:off x="200026" y="1249685"/>
+            <a:ext cx="8867774" cy="5632311"/>
+          </a:xfrm>
+          <a:prstGeom prst="rect">
+            <a:avLst/>
+          </a:prstGeom>
+        </p:spPr>
+        <p:txBody>
+          <a:bodyPr wrap="square">
+            <a:spAutoFit/>
+          </a:bodyPr>
+          <a:lstStyle/>
+          <a:p>
+            <a:pPr marL="457200" indent="-457200">
+              <a:buAutoNum type="arabicPeriod"/>
+            </a:pPr>
+            <a:r>
+              <a:rPr lang="en-US" sz="2400" dirty="0"/>
+              <a:t>Using Windows Explorer copy </a:t>
+            </a:r>
+            <a:r>
+              <a:rPr lang="en-US" sz="2400" dirty="0" err="1"/>
+              <a:t>myWindCode</a:t>
+            </a:r>
+            <a:r>
+              <a:rPr lang="en-US" sz="2400" dirty="0"/>
+              <a:t> folder to </a:t>
+            </a:r>
+            <a:r>
+              <a:rPr lang="en-US" sz="2400" dirty="0" smtClean="0"/>
+              <a:t>GitHub\firmware\user\applications</a:t>
+            </a:r>
+          </a:p>
+          <a:p>
+            <a:endParaRPr lang="en-US" sz="2400" dirty="0" smtClean="0"/>
+          </a:p>
+          <a:p>
+            <a:pPr marL="800100" lvl="1" indent="-342900">
+              <a:buFont typeface="Arial" panose="020B0604020202020204" pitchFamily="34" charset="0"/>
+              <a:buChar char="•"/>
+            </a:pPr>
+            <a:r>
+              <a:rPr lang="en-US" sz="2400" dirty="0"/>
+              <a:t>	</a:t>
+            </a:r>
+            <a:r>
+              <a:rPr lang="en-US" sz="2400" dirty="0" smtClean="0"/>
+              <a:t>You could use Link Shell Extension to link the folder</a:t>
+            </a:r>
+          </a:p>
+          <a:p>
+            <a:r>
+              <a:rPr lang="en-US" sz="2400" dirty="0"/>
+              <a:t>	</a:t>
+            </a:r>
+            <a:r>
+              <a:rPr lang="en-US" sz="2400" dirty="0" smtClean="0"/>
+              <a:t>right click on GitHub\Wind\</a:t>
+            </a:r>
+            <a:r>
+              <a:rPr lang="en-US" sz="2400" dirty="0" err="1" smtClean="0"/>
+              <a:t>myWindCode</a:t>
+            </a:r>
+            <a:endParaRPr lang="en-US" sz="2400" dirty="0" smtClean="0"/>
+          </a:p>
+          <a:p>
+            <a:r>
+              <a:rPr lang="en-US" sz="2400" dirty="0"/>
+              <a:t>	</a:t>
+            </a:r>
+            <a:r>
+              <a:rPr lang="en-US" sz="2400" dirty="0" smtClean="0"/>
+              <a:t>pick link source</a:t>
+            </a:r>
+          </a:p>
+          <a:p>
+            <a:r>
+              <a:rPr lang="en-US" sz="2400" dirty="0"/>
+              <a:t>	</a:t>
+            </a:r>
+            <a:r>
+              <a:rPr lang="en-US" sz="2400" dirty="0" smtClean="0"/>
+              <a:t>browse to GitHub\firmware\user\applications</a:t>
+            </a:r>
+          </a:p>
+          <a:p>
+            <a:r>
+              <a:rPr lang="en-US" sz="2400" dirty="0"/>
+              <a:t>	</a:t>
+            </a:r>
+            <a:r>
+              <a:rPr lang="en-US" sz="2400" dirty="0" smtClean="0"/>
+              <a:t>drop as symbolic link</a:t>
+            </a:r>
+          </a:p>
+          <a:p>
+            <a:endParaRPr lang="en-US" sz="2400" dirty="0"/>
+          </a:p>
+          <a:p>
+            <a:r>
+              <a:rPr lang="en-US" sz="2400" dirty="0" smtClean="0"/>
+              <a:t>If needed, using </a:t>
+            </a:r>
+            <a:r>
+              <a:rPr lang="en-US" sz="2400" dirty="0"/>
+              <a:t>your favorite editor, add the line:</a:t>
+            </a:r>
+          </a:p>
+          <a:p>
+            <a:r>
+              <a:rPr lang="en-US" sz="2400" dirty="0"/>
+              <a:t>	#include &lt;</a:t>
+            </a:r>
+            <a:r>
+              <a:rPr lang="en-US" sz="2400" dirty="0" err="1"/>
+              <a:t>Particle.h</a:t>
+            </a:r>
+            <a:r>
+              <a:rPr lang="en-US" sz="2400" dirty="0"/>
+              <a:t>&gt; </a:t>
+            </a:r>
+          </a:p>
+          <a:p>
+            <a:r>
+              <a:rPr lang="en-US" sz="2400" dirty="0"/>
+              <a:t>	after the line #include “</a:t>
+            </a:r>
+            <a:r>
+              <a:rPr lang="en-US" sz="2400" dirty="0" err="1"/>
+              <a:t>application.h</a:t>
+            </a:r>
+            <a:r>
+              <a:rPr lang="en-US" sz="2400" dirty="0" smtClean="0"/>
+              <a:t>”</a:t>
+            </a:r>
+          </a:p>
+          <a:p>
+            <a:r>
+              <a:rPr lang="en-US" sz="2400" dirty="0" smtClean="0"/>
+              <a:t>The application must have suffix “.</a:t>
+            </a:r>
+            <a:r>
+              <a:rPr lang="en-US" sz="2400" dirty="0" err="1" smtClean="0"/>
+              <a:t>cpp</a:t>
+            </a:r>
+            <a:r>
+              <a:rPr lang="en-US" sz="2400" dirty="0" smtClean="0"/>
+              <a:t>”  e.g. myWindCode.cpp</a:t>
+            </a:r>
+            <a:endParaRPr lang="en-US" sz="2400" dirty="0"/>
+          </a:p>
+          <a:p>
+            <a:endParaRPr lang="en-US" sz="2400" dirty="0"/>
+          </a:p>
+          <a:p>
+            <a:endParaRPr lang="en-US" sz="2400" dirty="0"/>
+          </a:p>
+        </p:txBody>
+      </p:sp>
+    </p:spTree>
+    <p:extLst>
+      <p:ext uri="{BB962C8B-B14F-4D97-AF65-F5344CB8AC3E}">
+        <p14:creationId xmlns:p14="http://schemas.microsoft.com/office/powerpoint/2010/main" val="1751966409"/>
+      </p:ext>
+    </p:extLst>
+  </p:cSld>
+  <p:clrMapOvr>
+    <a:masterClrMapping/>
+  </p:clrMapOvr>
+</p:sld>
+</file>
+
+<file path=ppt/slides/slide16.xml><?xml version="1.0" encoding="utf-8"?>
+<p:sld xmlns:a="http://schemas.openxmlformats.org/drawingml/2006/main" xmlns:r="http://schemas.openxmlformats.org/officeDocument/2006/relationships" xmlns:p="http://schemas.openxmlformats.org/presentationml/2006/main">
+  <p:cSld>
+    <p:spTree>
+      <p:nvGrpSpPr>
+        <p:cNvPr id="1" name=""/>
+        <p:cNvGrpSpPr/>
+        <p:nvPr/>
+      </p:nvGrpSpPr>
+      <p:grpSpPr>
+        <a:xfrm>
+          <a:off x="0" y="0"/>
+          <a:ext cx="0" cy="0"/>
+          <a:chOff x="0" y="0"/>
+          <a:chExt cx="0" cy="0"/>
+        </a:xfrm>
+      </p:grpSpPr>
+      <p:sp>
+        <p:nvSpPr>
+          <p:cNvPr id="2" name="Title 1"/>
+          <p:cNvSpPr>
+            <a:spLocks noGrp="1"/>
+          </p:cNvSpPr>
+          <p:nvPr>
+            <p:ph type="title"/>
+          </p:nvPr>
+        </p:nvSpPr>
         <p:spPr>
           <a:xfrm>
             <a:off x="342900" y="107802"/>
@@ -7446,8 +8081,23 @@
                 </a:solidFill>
                 <a:latin typeface="Helvetica" panose="020B0604020202020204" pitchFamily="34" charset="0"/>
               </a:rPr>
-              <a:t>cd ../main</a:t>
-            </a:r>
+              <a:t>cd </a:t>
+            </a:r>
+            <a:r>
+              <a:rPr lang="en-US" altLang="en-US" sz="1400" dirty="0" smtClean="0">
+                <a:solidFill>
+                  <a:srgbClr val="222222"/>
+                </a:solidFill>
+                <a:latin typeface="Helvetica" panose="020B0604020202020204" pitchFamily="34" charset="0"/>
+              </a:rPr>
+              <a:t>..\main</a:t>
+            </a:r>
+            <a:endParaRPr lang="en-US" altLang="en-US" sz="1400" dirty="0" smtClean="0">
+              <a:solidFill>
+                <a:srgbClr val="222222"/>
+              </a:solidFill>
+              <a:latin typeface="Helvetica" panose="020B0604020202020204" pitchFamily="34" charset="0"/>
+            </a:endParaRPr>
           </a:p>
           <a:p>
             <a:pPr marL="0" marR="0" lvl="0" indent="0" algn="l" defTabSz="914400" rtl="0" eaLnBrk="0" fontAlgn="base" latinLnBrk="0" hangingPunct="0">
@@ -10914,8 +11564,8 @@
         </p:nvSpPr>
         <p:spPr>
           <a:xfrm>
-            <a:off x="5462588" y="3137016"/>
-            <a:ext cx="3471862" cy="707886"/>
+            <a:off x="5429250" y="2885295"/>
+            <a:ext cx="3471862" cy="1015663"/>
           </a:xfrm>
           <a:prstGeom prst="rect">
             <a:avLst/>
@@ -10929,8 +11579,13 @@
           <a:p>
             <a:r>
               <a:rPr lang="en-US" sz="2000" dirty="0"/>
-              <a:t>Click “download” for mingw-get-setup.exe</a:t>
-            </a:r>
+              <a:t>Click “download” for </a:t>
+            </a:r>
+            <a:r>
+              <a:rPr lang="en-US" sz="2000" dirty="0" smtClean="0"/>
+              <a:t>mingw-get-setup.exe.  Open; all defaults.</a:t>
+            </a:r>
+            <a:endParaRPr lang="en-US" sz="2000" dirty="0"/>
           </a:p>
         </p:txBody>
       </p:sp>
@@ -11381,8 +12036,13 @@
           <a:p>
             <a:r>
               <a:rPr lang="en-US" sz="1800" dirty="0" smtClean="0"/>
-              <a:t>On win10</a:t>
-            </a:r>
+              <a:t>On </a:t>
+            </a:r>
+            <a:r>
+              <a:rPr lang="en-US" sz="1800" dirty="0" smtClean="0"/>
+              <a:t>win10 (SEE NEXT PAGE)</a:t>
+            </a:r>
+            <a:endParaRPr lang="en-US" sz="1800" dirty="0" smtClean="0"/>
           </a:p>
           <a:p>
             <a:r>

</xml_diff>

<commit_message>
totally portable no wifi needed for anything
Can use either Arduino IDE or Particle firmware CLI
</commit_message>
<xml_diff>
--- a/Documentation/A Course Controls Laptop Setup Instructions Standalone Photon.pptx
+++ b/Documentation/A Course Controls Laptop Setup Instructions Standalone Photon.pptx
@@ -5,10 +5,10 @@
     <p:sldMasterId id="2147483664" r:id="rId1"/>
   </p:sldMasterIdLst>
   <p:notesMasterIdLst>
-    <p:notesMasterId r:id="rId18"/>
+    <p:notesMasterId r:id="rId19"/>
   </p:notesMasterIdLst>
   <p:handoutMasterIdLst>
-    <p:handoutMasterId r:id="rId19"/>
+    <p:handoutMasterId r:id="rId20"/>
   </p:handoutMasterIdLst>
   <p:sldIdLst>
     <p:sldId id="1048" r:id="rId2"/>
@@ -27,29 +27,30 @@
     <p:sldId id="1062" r:id="rId15"/>
     <p:sldId id="1059" r:id="rId16"/>
     <p:sldId id="1060" r:id="rId17"/>
+    <p:sldId id="1064" r:id="rId18"/>
   </p:sldIdLst>
   <p:sldSz cx="9144000" cy="6858000" type="screen4x3"/>
   <p:notesSz cx="7023100" cy="9309100"/>
   <p:embeddedFontLst>
     <p:embeddedFont>
-      <p:font typeface="GE Inspira Pitch" panose="020B0604020202020204" charset="0"/>
-      <p:regular r:id="rId20"/>
-      <p:bold r:id="rId21"/>
-      <p:italic r:id="rId22"/>
+      <p:font typeface="Helvetica" panose="020B0604020202020204" pitchFamily="34" charset="0"/>
+      <p:regular r:id="rId21"/>
+      <p:bold r:id="rId22"/>
+      <p:italic r:id="rId23"/>
+      <p:boldItalic r:id="rId24"/>
     </p:embeddedFont>
     <p:embeddedFont>
       <p:font typeface="Consolas" panose="020B0609020204030204" pitchFamily="49" charset="0"/>
-      <p:regular r:id="rId23"/>
-      <p:bold r:id="rId24"/>
-      <p:italic r:id="rId25"/>
-      <p:boldItalic r:id="rId26"/>
+      <p:regular r:id="rId25"/>
+      <p:bold r:id="rId26"/>
+      <p:italic r:id="rId27"/>
+      <p:boldItalic r:id="rId28"/>
     </p:embeddedFont>
     <p:embeddedFont>
-      <p:font typeface="Helvetica" panose="020B0604020202020204" pitchFamily="34" charset="0"/>
-      <p:regular r:id="rId27"/>
-      <p:bold r:id="rId28"/>
-      <p:italic r:id="rId29"/>
-      <p:boldItalic r:id="rId30"/>
+      <p:font typeface="GE Inspira Pitch" panose="020B0604020202020204" charset="0"/>
+      <p:regular r:id="rId29"/>
+      <p:bold r:id="rId30"/>
+      <p:italic r:id="rId31"/>
     </p:embeddedFont>
   </p:embeddedFontLst>
   <p:defaultTextStyle>
@@ -6916,15 +6917,7 @@
             </a:r>
             <a:r>
               <a:rPr lang="en-US" sz="2000" dirty="0" smtClean="0"/>
-              <a:t>d “C:\Users\&lt;name&gt;\</a:t>
-            </a:r>
-            <a:r>
-              <a:rPr lang="en-US" sz="2000" dirty="0" smtClean="0"/>
-              <a:t>Documents\GitHub\firmware-develop\main</a:t>
-            </a:r>
-            <a:r>
-              <a:rPr lang="en-US" sz="2000" dirty="0" smtClean="0"/>
-              <a:t>” #for Win10</a:t>
+              <a:t>d “C:\Users\&lt;name&gt;\Documents\GitHub\firmware-develop\main” #for Win10</a:t>
             </a:r>
             <a:endParaRPr lang="en-US" sz="2000" dirty="0"/>
           </a:p>
@@ -8081,23 +8074,8 @@
                 </a:solidFill>
                 <a:latin typeface="Helvetica" panose="020B0604020202020204" pitchFamily="34" charset="0"/>
               </a:rPr>
-              <a:t>cd </a:t>
-            </a:r>
-            <a:r>
-              <a:rPr lang="en-US" altLang="en-US" sz="1400" dirty="0" smtClean="0">
-                <a:solidFill>
-                  <a:srgbClr val="222222"/>
-                </a:solidFill>
-                <a:latin typeface="Helvetica" panose="020B0604020202020204" pitchFamily="34" charset="0"/>
-              </a:rPr>
-              <a:t>..\main</a:t>
-            </a:r>
-            <a:endParaRPr lang="en-US" altLang="en-US" sz="1400" dirty="0" smtClean="0">
-              <a:solidFill>
-                <a:srgbClr val="222222"/>
-              </a:solidFill>
-              <a:latin typeface="Helvetica" panose="020B0604020202020204" pitchFamily="34" charset="0"/>
-            </a:endParaRPr>
+              <a:t>cd ..\main</a:t>
+            </a:r>
           </a:p>
           <a:p>
             <a:pPr marL="0" marR="0" lvl="0" indent="0" algn="l" defTabSz="914400" rtl="0" eaLnBrk="0" fontAlgn="base" latinLnBrk="0" hangingPunct="0">
@@ -8858,6 +8836,105 @@
     <p:extLst>
       <p:ext uri="{BB962C8B-B14F-4D97-AF65-F5344CB8AC3E}">
         <p14:creationId xmlns:p14="http://schemas.microsoft.com/office/powerpoint/2010/main" val="2964178970"/>
+      </p:ext>
+    </p:extLst>
+  </p:cSld>
+  <p:clrMapOvr>
+    <a:masterClrMapping/>
+  </p:clrMapOvr>
+</p:sld>
+</file>
+
+<file path=ppt/slides/slide17.xml><?xml version="1.0" encoding="utf-8"?>
+<p:sld xmlns:a="http://schemas.openxmlformats.org/drawingml/2006/main" xmlns:r="http://schemas.openxmlformats.org/officeDocument/2006/relationships" xmlns:p="http://schemas.openxmlformats.org/presentationml/2006/main">
+  <p:cSld>
+    <p:spTree>
+      <p:nvGrpSpPr>
+        <p:cNvPr id="1" name=""/>
+        <p:cNvGrpSpPr/>
+        <p:nvPr/>
+      </p:nvGrpSpPr>
+      <p:grpSpPr>
+        <a:xfrm>
+          <a:off x="0" y="0"/>
+          <a:ext cx="0" cy="0"/>
+          <a:chOff x="0" y="0"/>
+          <a:chExt cx="0" cy="0"/>
+        </a:xfrm>
+      </p:grpSpPr>
+      <p:sp>
+        <p:nvSpPr>
+          <p:cNvPr id="2" name="Title 1"/>
+          <p:cNvSpPr>
+            <a:spLocks noGrp="1"/>
+          </p:cNvSpPr>
+          <p:nvPr>
+            <p:ph type="title"/>
+          </p:nvPr>
+        </p:nvSpPr>
+        <p:spPr/>
+        <p:txBody>
+          <a:bodyPr/>
+          <a:lstStyle/>
+          <a:p>
+            <a:r>
+              <a:rPr lang="en-US" smtClean="0"/>
+              <a:t>Visual Studio IDE</a:t>
+            </a:r>
+            <a:endParaRPr lang="en-US" dirty="0"/>
+          </a:p>
+        </p:txBody>
+      </p:sp>
+      <p:sp>
+        <p:nvSpPr>
+          <p:cNvPr id="3" name="Content Placeholder 2"/>
+          <p:cNvSpPr>
+            <a:spLocks noGrp="1"/>
+          </p:cNvSpPr>
+          <p:nvPr>
+            <p:ph idx="1"/>
+          </p:nvPr>
+        </p:nvSpPr>
+        <p:spPr/>
+        <p:txBody>
+          <a:bodyPr/>
+          <a:lstStyle/>
+          <a:p>
+            <a:r>
+              <a:rPr lang="en-US" dirty="0" smtClean="0"/>
+              <a:t>With this method, the Visual Studio Code process that calls ‘particle’ will not work.   The compiler never finds the main.cc file. </a:t>
+            </a:r>
+          </a:p>
+          <a:p>
+            <a:pPr lvl="1"/>
+            <a:r>
+              <a:rPr lang="en-US" dirty="0" smtClean="0"/>
+              <a:t>To make the old process work, need </a:t>
+            </a:r>
+            <a:r>
+              <a:rPr lang="en-US" dirty="0" err="1" smtClean="0"/>
+              <a:t>myWindCode.ino</a:t>
+            </a:r>
+            <a:r>
+              <a:rPr lang="en-US" dirty="0" smtClean="0"/>
+              <a:t> or myWindCode.cpp application file without the #include “</a:t>
+            </a:r>
+            <a:r>
+              <a:rPr lang="en-US" dirty="0" err="1" smtClean="0"/>
+              <a:t>main.h</a:t>
+            </a:r>
+            <a:r>
+              <a:rPr lang="en-US" dirty="0" smtClean="0"/>
+              <a:t>” line.</a:t>
+            </a:r>
+            <a:endParaRPr lang="en-US" dirty="0"/>
+          </a:p>
+        </p:txBody>
+      </p:sp>
+    </p:spTree>
+    <p:extLst>
+      <p:ext uri="{BB962C8B-B14F-4D97-AF65-F5344CB8AC3E}">
+        <p14:creationId xmlns:p14="http://schemas.microsoft.com/office/powerpoint/2010/main" val="3669116936"/>
       </p:ext>
     </p:extLst>
   </p:cSld>
@@ -12036,13 +12113,8 @@
           <a:p>
             <a:r>
               <a:rPr lang="en-US" sz="1800" dirty="0" smtClean="0"/>
-              <a:t>On </a:t>
-            </a:r>
-            <a:r>
-              <a:rPr lang="en-US" sz="1800" dirty="0" smtClean="0"/>
-              <a:t>win10 (SEE NEXT PAGE)</a:t>
-            </a:r>
-            <a:endParaRPr lang="en-US" sz="1800" dirty="0" smtClean="0"/>
+              <a:t>On win10 (SEE NEXT PAGE)</a:t>
+            </a:r>
           </a:p>
           <a:p>
             <a:r>

</xml_diff>